<commit_message>
New version of poster
- Better layout
- Removed @
- Added image of example logigram
</commit_message>
<xml_diff>
--- a/poster/poster.pptx
+++ b/poster/poster.pptx
@@ -140,17 +140,25 @@
   <p:extLst>
     <p:ext uri="{EFAFB233-063F-42B5-8137-9DF3F51BA10A}">
       <p15:sldGuideLst xmlns:p15="http://schemas.microsoft.com/office/powerpoint/2012/main">
-        <p15:guide id="1" orient="horz" pos="9536">
+        <p15:guide id="1" orient="horz" pos="18970" userDrawn="1">
           <p15:clr>
             <a:srgbClr val="A4A3A4"/>
           </p15:clr>
         </p15:guide>
-        <p15:guide id="2" pos="6735">
+        <p15:guide id="2" pos="2335" userDrawn="1">
+          <p15:clr>
+            <a:srgbClr val="A4A3A4"/>
+          </p15:clr>
+        </p15:guide>
+        <p15:guide id="3" orient="horz" pos="1824" userDrawn="1">
           <p15:clr>
             <a:srgbClr val="A4A3A4"/>
           </p15:clr>
         </p15:guide>
       </p15:sldGuideLst>
+    </p:ext>
+    <p:ext uri="{2D200454-40CA-4A62-9FC3-DE9A4176ACB9}">
+      <p15:notesGuideLst xmlns:p15="http://schemas.microsoft.com/office/powerpoint/2012/main"/>
     </p:ext>
   </p:extLst>
 </p:presentation>
@@ -238,7 +246,7 @@
           <a:p>
             <a:fld id="{53C9DCA9-61C6-4BAE-92C6-94F0F0371E20}" type="datetimeFigureOut">
               <a:rPr lang="nl-BE" smtClean="0"/>
-              <a:t>20/04/2017</a:t>
+              <a:t>26/04/2017</a:t>
             </a:fld>
             <a:endParaRPr lang="nl-BE"/>
           </a:p>
@@ -2731,7 +2739,7 @@
         </p:nvSpPr>
         <p:spPr bwMode="auto">
           <a:xfrm>
-            <a:off x="12328444" y="19772568"/>
+            <a:off x="12410198" y="19787616"/>
             <a:ext cx="8560673" cy="1006475"/>
           </a:xfrm>
           <a:prstGeom prst="flowChartProcess">
@@ -2867,7 +2875,7 @@
         </p:nvSpPr>
         <p:spPr bwMode="auto">
           <a:xfrm>
-            <a:off x="12397583" y="2890281"/>
+            <a:off x="12479338" y="2826964"/>
             <a:ext cx="8890000" cy="1023938"/>
           </a:xfrm>
           <a:prstGeom prst="rect">
@@ -3020,8 +3028,8 @@
         </p:nvSpPr>
         <p:spPr bwMode="auto">
           <a:xfrm>
-            <a:off x="3625058" y="4041220"/>
-            <a:ext cx="17264062" cy="2722562"/>
+            <a:off x="3706813" y="3977903"/>
+            <a:ext cx="13339289" cy="2722562"/>
           </a:xfrm>
           <a:prstGeom prst="rect">
             <a:avLst/>
@@ -3200,9 +3208,6 @@
               </a:rPr>
               <a:t> in natuurlijke taal) naar een formele specificatie in logica</a:t>
             </a:r>
-            <a:endParaRPr lang="nl-NL" altLang="en-US" sz="2400" dirty="0" smtClean="0">
-              <a:latin typeface="+mj-lt"/>
-            </a:endParaRPr>
           </a:p>
         </p:txBody>
       </p:sp>
@@ -3216,8 +3221,8 @@
         </p:nvSpPr>
         <p:spPr bwMode="auto">
           <a:xfrm>
-            <a:off x="3625058" y="2961719"/>
-            <a:ext cx="17264062" cy="1006475"/>
+            <a:off x="3706814" y="2898402"/>
+            <a:ext cx="13339288" cy="1006475"/>
           </a:xfrm>
           <a:prstGeom prst="flowChartProcess">
             <a:avLst/>
@@ -3352,7 +3357,7 @@
         </p:nvSpPr>
         <p:spPr bwMode="auto">
           <a:xfrm>
-            <a:off x="3625058" y="2872819"/>
+            <a:off x="3706813" y="2809502"/>
             <a:ext cx="8488362" cy="1023937"/>
           </a:xfrm>
           <a:prstGeom prst="rect">
@@ -3674,7 +3679,7 @@
         </p:nvSpPr>
         <p:spPr bwMode="auto">
           <a:xfrm>
-            <a:off x="3823495" y="2958544"/>
+            <a:off x="3905250" y="2895227"/>
             <a:ext cx="8488363" cy="1023937"/>
           </a:xfrm>
           <a:prstGeom prst="rect">
@@ -3831,7 +3836,7 @@
         </p:nvSpPr>
         <p:spPr bwMode="auto">
           <a:xfrm>
-            <a:off x="12397583" y="19777219"/>
+            <a:off x="12479337" y="19792267"/>
             <a:ext cx="8996152" cy="1011238"/>
           </a:xfrm>
           <a:prstGeom prst="rect">
@@ -4526,14 +4531,14 @@
               <p:nvPr>
                 <p:extLst>
                   <p:ext uri="{D42A27DB-BD31-4B8C-83A1-F6EECF244321}">
-                    <p14:modId xmlns:p14="http://schemas.microsoft.com/office/powerpoint/2010/main" val="1661248020"/>
+                    <p14:modId xmlns:p14="http://schemas.microsoft.com/office/powerpoint/2010/main" val="3021924190"/>
                   </p:ext>
                 </p:extLst>
               </p:nvPr>
             </p:nvGraphicFramePr>
             <p:xfrm>
-              <a:off x="3624987" y="8879592"/>
-              <a:ext cx="11226051" cy="4336288"/>
+              <a:off x="3706741" y="8803932"/>
+              <a:ext cx="11099273" cy="4297680"/>
             </p:xfrm>
             <a:graphic>
               <a:graphicData uri="http://schemas.openxmlformats.org/drawingml/2006/table">
@@ -4544,7 +4549,7 @@
                   <a:tblGrid>
                     <a:gridCol w="1600713"/>
                     <a:gridCol w="2935800"/>
-                    <a:gridCol w="6689538"/>
+                    <a:gridCol w="6562760"/>
                   </a:tblGrid>
                   <a:tr h="371452">
                     <a:tc>
@@ -4612,11 +4617,7 @@
                         <a:p>
                           <a:r>
                             <a:rPr lang="nl-BE" sz="2400" dirty="0" smtClean="0"/>
-                            <a:t>Lidwoord </a:t>
-                          </a:r>
-                          <a:r>
-                            <a:rPr lang="nl-BE" sz="2400" dirty="0" smtClean="0"/>
-                            <a:t>(DET)</a:t>
+                            <a:t>Lidwoord (DET)</a:t>
                           </a:r>
                           <a:endParaRPr lang="nl-BE" sz="2400" dirty="0"/>
                         </a:p>
@@ -4710,7 +4711,7 @@
                                     <a:latin typeface="Cambria Math" panose="02040503050406030204" pitchFamily="18" charset="0"/>
                                     <a:ea typeface="Cambria Math" panose="02040503050406030204" pitchFamily="18" charset="0"/>
                                   </a:rPr>
-                                  <m:t>@</m:t>
+                                  <m:t>(</m:t>
                                 </m:r>
                                 <m:r>
                                   <a:rPr lang="en-US" sz="2400" b="0" i="1" smtClean="0">
@@ -4718,6 +4719,13 @@
                                     <a:ea typeface="Cambria Math" panose="02040503050406030204" pitchFamily="18" charset="0"/>
                                   </a:rPr>
                                   <m:t>𝑥</m:t>
+                                </m:r>
+                                <m:r>
+                                  <a:rPr lang="en-US" sz="2400" b="0" i="1" smtClean="0">
+                                    <a:latin typeface="Cambria Math" panose="02040503050406030204" pitchFamily="18" charset="0"/>
+                                    <a:ea typeface="Cambria Math" panose="02040503050406030204" pitchFamily="18" charset="0"/>
+                                  </a:rPr>
+                                  <m:t>)</m:t>
                                 </m:r>
                                 <m:r>
                                   <a:rPr lang="en-US" sz="2400" b="0" i="1" smtClean="0">
@@ -4738,7 +4746,7 @@
                                     <a:latin typeface="Cambria Math" panose="02040503050406030204" pitchFamily="18" charset="0"/>
                                     <a:ea typeface="Cambria Math" panose="02040503050406030204" pitchFamily="18" charset="0"/>
                                   </a:rPr>
-                                  <m:t>@</m:t>
+                                  <m:t>(</m:t>
                                 </m:r>
                                 <m:r>
                                   <a:rPr lang="en-US" sz="2400" b="0" i="1" smtClean="0">
@@ -4746,6 +4754,13 @@
                                     <a:ea typeface="Cambria Math" panose="02040503050406030204" pitchFamily="18" charset="0"/>
                                   </a:rPr>
                                   <m:t>𝑥</m:t>
+                                </m:r>
+                                <m:r>
+                                  <a:rPr lang="en-US" sz="2400" b="0" i="1" smtClean="0">
+                                    <a:latin typeface="Cambria Math" panose="02040503050406030204" pitchFamily="18" charset="0"/>
+                                    <a:ea typeface="Cambria Math" panose="02040503050406030204" pitchFamily="18" charset="0"/>
+                                  </a:rPr>
+                                  <m:t>)</m:t>
                                 </m:r>
                               </m:oMath>
                             </m:oMathPara>
@@ -4778,11 +4793,7 @@
                         <a:p>
                           <a:r>
                             <a:rPr lang="nl-BE" sz="2400" dirty="0" smtClean="0"/>
-                            <a:t>Substantief </a:t>
-                          </a:r>
-                          <a:r>
-                            <a:rPr lang="nl-BE" sz="2400" dirty="0" smtClean="0"/>
-                            <a:t>(NOUN)</a:t>
+                            <a:t>Substantief (NOUN)</a:t>
                           </a:r>
                           <a:endParaRPr lang="nl-BE" sz="2400" dirty="0"/>
                         </a:p>
@@ -4904,11 +4915,7 @@
                         <a:p>
                           <a:r>
                             <a:rPr lang="nl-BE" sz="2400" dirty="0" smtClean="0"/>
-                            <a:t>Voorzetsel </a:t>
-                          </a:r>
-                          <a:r>
-                            <a:rPr lang="nl-BE" sz="2400" dirty="0" smtClean="0"/>
-                            <a:t>(PREP)</a:t>
+                            <a:t>Voorzetsel (PREP)</a:t>
                           </a:r>
                           <a:endParaRPr lang="nl-BE" sz="2400" dirty="0"/>
                         </a:p>
@@ -5023,13 +5030,6 @@
                                   </a:rPr>
                                   <m:t>N</m:t>
                                 </m:r>
-                                <m:r>
-                                  <a:rPr lang="en-US" sz="2400" b="0" i="0" smtClean="0">
-                                    <a:latin typeface="Cambria Math" panose="02040503050406030204" pitchFamily="18" charset="0"/>
-                                    <a:ea typeface="Cambria Math" panose="02040503050406030204" pitchFamily="18" charset="0"/>
-                                  </a:rPr>
-                                  <m:t>@</m:t>
-                                </m:r>
                                 <m:d>
                                   <m:dPr>
                                     <m:ctrlPr>
@@ -5120,7 +5120,7 @@
                                         <a:latin typeface="Cambria Math" panose="02040503050406030204" pitchFamily="18" charset="0"/>
                                         <a:ea typeface="Cambria Math" panose="02040503050406030204" pitchFamily="18" charset="0"/>
                                       </a:rPr>
-                                      <m:t>@</m:t>
+                                      <m:t>(</m:t>
                                     </m:r>
                                     <m:r>
                                       <a:rPr lang="en-US" sz="2400" b="0" i="1" smtClean="0">
@@ -5128,6 +5128,13 @@
                                         <a:ea typeface="Cambria Math" panose="02040503050406030204" pitchFamily="18" charset="0"/>
                                       </a:rPr>
                                       <m:t>𝑥</m:t>
+                                    </m:r>
+                                    <m:r>
+                                      <a:rPr lang="en-US" sz="2400" b="0" i="1" smtClean="0">
+                                        <a:latin typeface="Cambria Math" panose="02040503050406030204" pitchFamily="18" charset="0"/>
+                                        <a:ea typeface="Cambria Math" panose="02040503050406030204" pitchFamily="18" charset="0"/>
+                                      </a:rPr>
+                                      <m:t>)</m:t>
                                     </m:r>
                                   </m:e>
                                 </m:d>
@@ -5172,11 +5179,7 @@
                           </a:r>
                           <a:r>
                             <a:rPr lang="nl-BE" sz="2400" baseline="0" dirty="0" smtClean="0"/>
-                            <a:t> </a:t>
-                          </a:r>
-                          <a:r>
-                            <a:rPr lang="nl-BE" sz="2400" baseline="0" dirty="0" smtClean="0"/>
-                            <a:t>(PN)</a:t>
+                            <a:t> (PN)</a:t>
                           </a:r>
                           <a:endParaRPr lang="nl-BE" sz="2400" dirty="0"/>
                         </a:p>
@@ -5251,7 +5254,7 @@
                                     <a:latin typeface="Cambria Math" panose="02040503050406030204" pitchFamily="18" charset="0"/>
                                     <a:ea typeface="Cambria Math" panose="02040503050406030204" pitchFamily="18" charset="0"/>
                                   </a:rPr>
-                                  <m:t>@</m:t>
+                                  <m:t>(</m:t>
                                 </m:r>
                                 <m:r>
                                   <a:rPr lang="en-US" sz="2400" b="0" i="1" smtClean="0">
@@ -5259,6 +5262,13 @@
                                     <a:ea typeface="Cambria Math" panose="02040503050406030204" pitchFamily="18" charset="0"/>
                                   </a:rPr>
                                   <m:t>𝑀𝑜𝑢𝑛𝑡𝑈𝑛𝑖𝑜𝑛</m:t>
+                                </m:r>
+                                <m:r>
+                                  <a:rPr lang="en-US" sz="2400" b="0" i="1" smtClean="0">
+                                    <a:latin typeface="Cambria Math" panose="02040503050406030204" pitchFamily="18" charset="0"/>
+                                    <a:ea typeface="Cambria Math" panose="02040503050406030204" pitchFamily="18" charset="0"/>
+                                  </a:rPr>
+                                  <m:t>)</m:t>
                                 </m:r>
                               </m:oMath>
                             </m:oMathPara>
@@ -5291,11 +5301,7 @@
                         <a:p>
                           <a:r>
                             <a:rPr lang="nl-BE" sz="2400" dirty="0" smtClean="0"/>
-                            <a:t>Overgankelijk werkwoord </a:t>
-                          </a:r>
-                          <a:r>
-                            <a:rPr lang="nl-BE" sz="2400" dirty="0" smtClean="0"/>
-                            <a:t>(TV)</a:t>
+                            <a:t>Overgankelijk werkwoord (TV)</a:t>
                           </a:r>
                           <a:endParaRPr lang="nl-BE" sz="2400" dirty="0"/>
                         </a:p>
@@ -5394,7 +5400,7 @@
                                     <a:latin typeface="Cambria Math" panose="02040503050406030204" pitchFamily="18" charset="0"/>
                                     <a:ea typeface="Cambria Math" panose="02040503050406030204" pitchFamily="18" charset="0"/>
                                   </a:rPr>
-                                  <m:t>2@</m:t>
+                                  <m:t>2</m:t>
                                 </m:r>
                                 <m:d>
                                   <m:dPr>
@@ -5439,7 +5445,7 @@
                                         <a:latin typeface="Cambria Math" panose="02040503050406030204" pitchFamily="18" charset="0"/>
                                         <a:ea typeface="Cambria Math" panose="02040503050406030204" pitchFamily="18" charset="0"/>
                                       </a:rPr>
-                                      <m:t>1@</m:t>
+                                      <m:t>1</m:t>
                                     </m:r>
                                     <m:d>
                                       <m:dPr>
@@ -5557,11 +5563,7 @@
                           </a:r>
                           <a:r>
                             <a:rPr lang="nl-BE" sz="2400" baseline="0" dirty="0" smtClean="0"/>
-                            <a:t> </a:t>
-                          </a:r>
-                          <a:r>
-                            <a:rPr lang="nl-BE" sz="2400" baseline="0" dirty="0" smtClean="0"/>
-                            <a:t>(PN)</a:t>
+                            <a:t> (PN)</a:t>
                           </a:r>
                           <a:endParaRPr lang="nl-BE" sz="2400" dirty="0"/>
                         </a:p>
@@ -5636,7 +5638,7 @@
                                     <a:latin typeface="Cambria Math" panose="02040503050406030204" pitchFamily="18" charset="0"/>
                                     <a:ea typeface="Cambria Math" panose="02040503050406030204" pitchFamily="18" charset="0"/>
                                   </a:rPr>
-                                  <m:t>@</m:t>
+                                  <m:t>(</m:t>
                                 </m:r>
                                 <m:r>
                                   <a:rPr lang="en-US" sz="2400" b="0" i="1" smtClean="0">
@@ -5644,6 +5646,13 @@
                                     <a:ea typeface="Cambria Math" panose="02040503050406030204" pitchFamily="18" charset="0"/>
                                   </a:rPr>
                                   <m:t>𝑇h𝑒𝐵𝑙𝑎𝑐𝑘𝐷𝑎𝑟𝑡𝑠</m:t>
+                                </m:r>
+                                <m:r>
+                                  <a:rPr lang="en-US" sz="2400" b="0" i="1" smtClean="0">
+                                    <a:latin typeface="Cambria Math" panose="02040503050406030204" pitchFamily="18" charset="0"/>
+                                    <a:ea typeface="Cambria Math" panose="02040503050406030204" pitchFamily="18" charset="0"/>
+                                  </a:rPr>
+                                  <m:t>)</m:t>
                                 </m:r>
                               </m:oMath>
                             </m:oMathPara>
@@ -5669,14 +5678,14 @@
               <p:nvPr>
                 <p:extLst>
                   <p:ext uri="{D42A27DB-BD31-4B8C-83A1-F6EECF244321}">
-                    <p14:modId xmlns:p14="http://schemas.microsoft.com/office/powerpoint/2010/main" val="1661248020"/>
+                    <p14:modId xmlns:p14="http://schemas.microsoft.com/office/powerpoint/2010/main" val="3021924190"/>
                   </p:ext>
                 </p:extLst>
               </p:nvPr>
             </p:nvGraphicFramePr>
             <p:xfrm>
-              <a:off x="3624987" y="8879592"/>
-              <a:ext cx="11226051" cy="4336288"/>
+              <a:off x="3706741" y="8803932"/>
+              <a:ext cx="11099273" cy="4297680"/>
             </p:xfrm>
             <a:graphic>
               <a:graphicData uri="http://schemas.openxmlformats.org/drawingml/2006/table">
@@ -5687,7 +5696,7 @@
                   <a:tblGrid>
                     <a:gridCol w="1600713"/>
                     <a:gridCol w="2935800"/>
-                    <a:gridCol w="6689538"/>
+                    <a:gridCol w="6562760"/>
                   </a:tblGrid>
                   <a:tr h="457200">
                     <a:tc>
@@ -5755,11 +5764,7 @@
                         <a:p>
                           <a:r>
                             <a:rPr lang="nl-BE" sz="2400" dirty="0" smtClean="0"/>
-                            <a:t>Lidwoord </a:t>
-                          </a:r>
-                          <a:r>
-                            <a:rPr lang="nl-BE" sz="2400" dirty="0" smtClean="0"/>
-                            <a:t>(DET)</a:t>
+                            <a:t>Lidwoord (DET)</a:t>
                           </a:r>
                           <a:endParaRPr lang="nl-BE" sz="2400" dirty="0"/>
                         </a:p>
@@ -5778,7 +5783,7 @@
                         <a:blipFill rotWithShape="0">
                           <a:blip r:embed="rId4"/>
                           <a:stretch>
-                            <a:fillRect l="-67942" t="-108000" r="-364" b="-781333"/>
+                            <a:fillRect l="-69174" t="-109333" r="-371" b="-772000"/>
                           </a:stretch>
                         </a:blipFill>
                       </a:tcPr>
@@ -5806,11 +5811,7 @@
                         <a:p>
                           <a:r>
                             <a:rPr lang="nl-BE" sz="2400" dirty="0" smtClean="0"/>
-                            <a:t>Substantief </a:t>
-                          </a:r>
-                          <a:r>
-                            <a:rPr lang="nl-BE" sz="2400" dirty="0" smtClean="0"/>
-                            <a:t>(NOUN)</a:t>
+                            <a:t>Substantief (NOUN)</a:t>
                           </a:r>
                           <a:endParaRPr lang="nl-BE" sz="2400" dirty="0"/>
                         </a:p>
@@ -5829,7 +5830,7 @@
                         <a:blipFill rotWithShape="0">
                           <a:blip r:embed="rId4"/>
                           <a:stretch>
-                            <a:fillRect l="-67942" t="-208000" r="-364" b="-681333"/>
+                            <a:fillRect l="-69174" t="-209333" r="-371" b="-672000"/>
                           </a:stretch>
                         </a:blipFill>
                       </a:tcPr>
@@ -5857,11 +5858,7 @@
                         <a:p>
                           <a:r>
                             <a:rPr lang="nl-BE" sz="2400" dirty="0" smtClean="0"/>
-                            <a:t>Voorzetsel </a:t>
-                          </a:r>
-                          <a:r>
-                            <a:rPr lang="nl-BE" sz="2400" dirty="0" smtClean="0"/>
-                            <a:t>(PREP)</a:t>
+                            <a:t>Voorzetsel (PREP)</a:t>
                           </a:r>
                           <a:endParaRPr lang="nl-BE" sz="2400" dirty="0"/>
                         </a:p>
@@ -5880,7 +5877,7 @@
                         <a:blipFill rotWithShape="0">
                           <a:blip r:embed="rId4"/>
                           <a:stretch>
-                            <a:fillRect l="-67942" t="-308000" r="-364" b="-581333"/>
+                            <a:fillRect l="-69174" t="-309333" r="-371" b="-572000"/>
                           </a:stretch>
                         </a:blipFill>
                       </a:tcPr>
@@ -5918,11 +5915,7 @@
                           </a:r>
                           <a:r>
                             <a:rPr lang="nl-BE" sz="2400" baseline="0" dirty="0" smtClean="0"/>
-                            <a:t> </a:t>
-                          </a:r>
-                          <a:r>
-                            <a:rPr lang="nl-BE" sz="2400" baseline="0" dirty="0" smtClean="0"/>
-                            <a:t>(PN)</a:t>
+                            <a:t> (PN)</a:t>
                           </a:r>
                           <a:endParaRPr lang="nl-BE" sz="2400" dirty="0"/>
                         </a:p>
@@ -5941,13 +5934,13 @@
                         <a:blipFill rotWithShape="0">
                           <a:blip r:embed="rId4"/>
                           <a:stretch>
-                            <a:fillRect l="-67942" t="-226667" r="-364" b="-222963"/>
+                            <a:fillRect l="-69174" t="-225735" r="-371" b="-215441"/>
                           </a:stretch>
                         </a:blipFill>
                       </a:tcPr>
                     </a:tc>
                   </a:tr>
-                  <a:tr h="861568">
+                  <a:tr h="822960">
                     <a:tc>
                       <a:txBody>
                         <a:bodyPr/>
@@ -5969,11 +5962,7 @@
                         <a:p>
                           <a:r>
                             <a:rPr lang="nl-BE" sz="2400" dirty="0" smtClean="0"/>
-                            <a:t>Overgankelijk werkwoord </a:t>
-                          </a:r>
-                          <a:r>
-                            <a:rPr lang="nl-BE" sz="2400" dirty="0" smtClean="0"/>
-                            <a:t>(TV)</a:t>
+                            <a:t>Overgankelijk werkwoord (TV)</a:t>
                           </a:r>
                           <a:endParaRPr lang="nl-BE" sz="2400" dirty="0"/>
                         </a:p>
@@ -5992,7 +5981,7 @@
                         <a:blipFill rotWithShape="0">
                           <a:blip r:embed="rId4"/>
                           <a:stretch>
-                            <a:fillRect l="-67942" t="-310563" r="-364" b="-111972"/>
+                            <a:fillRect l="-69174" t="-328148" r="-371" b="-117037"/>
                           </a:stretch>
                         </a:blipFill>
                       </a:tcPr>
@@ -6028,11 +6017,7 @@
                           </a:r>
                           <a:r>
                             <a:rPr lang="nl-BE" sz="2400" baseline="0" dirty="0" smtClean="0"/>
-                            <a:t> </a:t>
-                          </a:r>
-                          <a:r>
-                            <a:rPr lang="nl-BE" sz="2400" baseline="0" dirty="0" smtClean="0"/>
-                            <a:t>(PN)</a:t>
+                            <a:t> (PN)</a:t>
                           </a:r>
                           <a:endParaRPr lang="nl-BE" sz="2400" dirty="0"/>
                         </a:p>
@@ -6051,7 +6036,7 @@
                         <a:blipFill rotWithShape="0">
                           <a:blip r:embed="rId4"/>
                           <a:stretch>
-                            <a:fillRect l="-67942" t="-431852" r="-364" b="-17778"/>
+                            <a:fillRect l="-69174" t="-428148" r="-371" b="-17037"/>
                           </a:stretch>
                         </a:blipFill>
                       </a:tcPr>
@@ -6071,7 +6056,7 @@
         </p:nvGrpSpPr>
         <p:grpSpPr>
           <a:xfrm>
-            <a:off x="3624987" y="6926854"/>
+            <a:off x="3706746" y="6811658"/>
             <a:ext cx="17264132" cy="1053401"/>
             <a:chOff x="3595984" y="19936524"/>
             <a:chExt cx="17264132" cy="1053401"/>
@@ -6387,16 +6372,16 @@
       </p:grpSp>
       <p:grpSp>
         <p:nvGrpSpPr>
-          <p:cNvPr id="9" name="Groep 8"/>
+          <p:cNvPr id="16" name="Groep 15"/>
           <p:cNvGrpSpPr/>
           <p:nvPr/>
         </p:nvGrpSpPr>
         <p:grpSpPr>
           <a:xfrm>
-            <a:off x="15189587" y="8096194"/>
-            <a:ext cx="5699532" cy="623981"/>
-            <a:chOff x="15372332" y="8679978"/>
-            <a:chExt cx="5462018" cy="623981"/>
+            <a:off x="15012293" y="8020534"/>
+            <a:ext cx="5958580" cy="623981"/>
+            <a:chOff x="15071057" y="8096194"/>
+            <a:chExt cx="5818062" cy="623981"/>
           </a:xfrm>
         </p:grpSpPr>
         <p:sp>
@@ -6409,8 +6394,8 @@
           </p:nvSpPr>
           <p:spPr bwMode="auto">
             <a:xfrm>
-              <a:off x="15372332" y="8679978"/>
-              <a:ext cx="5462017" cy="623981"/>
+              <a:off x="15071057" y="8096194"/>
+              <a:ext cx="5818061" cy="623981"/>
             </a:xfrm>
             <a:prstGeom prst="flowChartProcess">
               <a:avLst/>
@@ -6549,8 +6534,8 @@
           </p:nvSpPr>
           <p:spPr bwMode="auto">
             <a:xfrm>
-              <a:off x="15372332" y="8679978"/>
-              <a:ext cx="5462018" cy="607326"/>
+              <a:off x="15071057" y="8096194"/>
+              <a:ext cx="5818062" cy="607326"/>
             </a:xfrm>
             <a:prstGeom prst="rect">
               <a:avLst/>
@@ -6693,13 +6678,6 @@
                 </a:rPr>
                 <a:t>Grammatica</a:t>
               </a:r>
-              <a:endParaRPr lang="nl-NL" altLang="en-US" sz="4000" b="1" dirty="0" smtClean="0">
-                <a:solidFill>
-                  <a:schemeClr val="bg1"/>
-                </a:solidFill>
-                <a:latin typeface="Calibri" panose="020F0502020204030204" pitchFamily="34" charset="0"/>
-                <a:ea typeface="ヒラギノ角ゴ Pro W3" pitchFamily="80" charset="-128"/>
-              </a:endParaRPr>
             </a:p>
           </p:txBody>
         </p:sp>
@@ -6715,14 +6693,14 @@
               <p:nvPr>
                 <p:extLst>
                   <p:ext uri="{D42A27DB-BD31-4B8C-83A1-F6EECF244321}">
-                    <p14:modId xmlns:p14="http://schemas.microsoft.com/office/powerpoint/2010/main" val="1787365281"/>
+                    <p14:modId xmlns:p14="http://schemas.microsoft.com/office/powerpoint/2010/main" val="2805203420"/>
                   </p:ext>
                 </p:extLst>
               </p:nvPr>
             </p:nvGraphicFramePr>
             <p:xfrm>
-              <a:off x="15227707" y="8866385"/>
-              <a:ext cx="5661410" cy="3566160"/>
+              <a:off x="15012293" y="8790723"/>
+              <a:ext cx="5958578" cy="4316620"/>
             </p:xfrm>
             <a:graphic>
               <a:graphicData uri="http://schemas.openxmlformats.org/drawingml/2006/table">
@@ -6731,10 +6709,10 @@
                     <a:tableStyleId>{93296810-A885-4BE3-A3E7-6D5BEEA58F35}</a:tableStyleId>
                   </a:tblPr>
                   <a:tblGrid>
-                    <a:gridCol w="2946814"/>
-                    <a:gridCol w="2714596"/>
+                    <a:gridCol w="3101493"/>
+                    <a:gridCol w="2857085"/>
                   </a:tblGrid>
-                  <a:tr h="370840">
+                  <a:tr h="616660">
                     <a:tc>
                       <a:txBody>
                         <a:bodyPr/>
@@ -6764,7 +6742,7 @@
                       <a:tcPr/>
                     </a:tc>
                   </a:tr>
-                  <a:tr h="370840">
+                  <a:tr h="616660">
                     <a:tc>
                       <a:txBody>
                         <a:bodyPr/>
@@ -6839,7 +6817,7 @@
                                     <a:latin typeface="Cambria Math" panose="02040503050406030204" pitchFamily="18" charset="0"/>
                                     <a:ea typeface="Cambria Math" panose="02040503050406030204" pitchFamily="18" charset="0"/>
                                   </a:rPr>
-                                  <m:t>@</m:t>
+                                  <m:t>(</m:t>
                                 </m:r>
                                 <m:d>
                                   <m:dPr>
@@ -6862,6 +6840,13 @@
                                     </m:r>
                                   </m:e>
                                 </m:d>
+                                <m:r>
+                                  <a:rPr lang="en-US" sz="2400" b="0" i="1" smtClean="0">
+                                    <a:latin typeface="Cambria Math" panose="02040503050406030204" pitchFamily="18" charset="0"/>
+                                    <a:ea typeface="Cambria Math" panose="02040503050406030204" pitchFamily="18" charset="0"/>
+                                  </a:rPr>
+                                  <m:t>)</m:t>
+                                </m:r>
                               </m:oMath>
                             </m:oMathPara>
                           </a14:m>
@@ -6871,7 +6856,7 @@
                       <a:tcPr/>
                     </a:tc>
                   </a:tr>
-                  <a:tr h="370840">
+                  <a:tr h="616660">
                     <a:tc>
                       <a:txBody>
                         <a:bodyPr/>
@@ -6946,7 +6931,7 @@
                                     <a:latin typeface="Cambria Math" panose="02040503050406030204" pitchFamily="18" charset="0"/>
                                     <a:ea typeface="Cambria Math" panose="02040503050406030204" pitchFamily="18" charset="0"/>
                                   </a:rPr>
-                                  <m:t>@</m:t>
+                                  <m:t>(</m:t>
                                 </m:r>
                                 <m:d>
                                   <m:dPr>
@@ -6969,6 +6954,13 @@
                                     </m:r>
                                   </m:e>
                                 </m:d>
+                                <m:r>
+                                  <a:rPr lang="en-US" sz="2400" b="0" i="1" smtClean="0">
+                                    <a:latin typeface="Cambria Math" panose="02040503050406030204" pitchFamily="18" charset="0"/>
+                                    <a:ea typeface="Cambria Math" panose="02040503050406030204" pitchFamily="18" charset="0"/>
+                                  </a:rPr>
+                                  <m:t>)</m:t>
+                                </m:r>
                               </m:oMath>
                             </m:oMathPara>
                           </a14:m>
@@ -6978,7 +6970,7 @@
                       <a:tcPr/>
                     </a:tc>
                   </a:tr>
-                  <a:tr h="370840">
+                  <a:tr h="616660">
                     <a:tc>
                       <a:txBody>
                         <a:bodyPr/>
@@ -7057,7 +7049,7 @@
                       <a:tcPr/>
                     </a:tc>
                   </a:tr>
-                  <a:tr h="370840">
+                  <a:tr h="616660">
                     <a:tc>
                       <a:txBody>
                         <a:bodyPr/>
@@ -7132,7 +7124,7 @@
                                     <a:latin typeface="Cambria Math" panose="02040503050406030204" pitchFamily="18" charset="0"/>
                                     <a:ea typeface="Cambria Math" panose="02040503050406030204" pitchFamily="18" charset="0"/>
                                   </a:rPr>
-                                  <m:t>@</m:t>
+                                  <m:t>(</m:t>
                                 </m:r>
                                 <m:d>
                                   <m:dPr>
@@ -7155,6 +7147,13 @@
                                     </m:r>
                                   </m:e>
                                 </m:d>
+                                <m:r>
+                                  <a:rPr lang="en-US" sz="2400" b="0" i="1" smtClean="0">
+                                    <a:latin typeface="Cambria Math" panose="02040503050406030204" pitchFamily="18" charset="0"/>
+                                    <a:ea typeface="Cambria Math" panose="02040503050406030204" pitchFamily="18" charset="0"/>
+                                  </a:rPr>
+                                  <m:t>)</m:t>
+                                </m:r>
                               </m:oMath>
                             </m:oMathPara>
                           </a14:m>
@@ -7164,7 +7163,7 @@
                       <a:tcPr/>
                     </a:tc>
                   </a:tr>
-                  <a:tr h="370840">
+                  <a:tr h="616660">
                     <a:tc>
                       <a:txBody>
                         <a:bodyPr/>
@@ -7239,7 +7238,7 @@
                                     <a:latin typeface="Cambria Math" panose="02040503050406030204" pitchFamily="18" charset="0"/>
                                     <a:ea typeface="Cambria Math" panose="02040503050406030204" pitchFamily="18" charset="0"/>
                                   </a:rPr>
-                                  <m:t>@</m:t>
+                                  <m:t>(</m:t>
                                 </m:r>
                                 <m:d>
                                   <m:dPr>
@@ -7262,6 +7261,13 @@
                                     </m:r>
                                   </m:e>
                                 </m:d>
+                                <m:r>
+                                  <a:rPr lang="en-US" sz="2400" b="0" i="1" smtClean="0">
+                                    <a:latin typeface="Cambria Math" panose="02040503050406030204" pitchFamily="18" charset="0"/>
+                                    <a:ea typeface="Cambria Math" panose="02040503050406030204" pitchFamily="18" charset="0"/>
+                                  </a:rPr>
+                                  <m:t>)</m:t>
+                                </m:r>
                               </m:oMath>
                             </m:oMathPara>
                           </a14:m>
@@ -7271,7 +7277,7 @@
                       <a:tcPr/>
                     </a:tc>
                   </a:tr>
-                  <a:tr h="370840">
+                  <a:tr h="616660">
                     <a:tc>
                       <a:txBody>
                         <a:bodyPr/>
@@ -7346,7 +7352,7 @@
                                     <a:latin typeface="Cambria Math" panose="02040503050406030204" pitchFamily="18" charset="0"/>
                                     <a:ea typeface="Cambria Math" panose="02040503050406030204" pitchFamily="18" charset="0"/>
                                   </a:rPr>
-                                  <m:t>@</m:t>
+                                  <m:t>(</m:t>
                                 </m:r>
                                 <m:d>
                                   <m:dPr>
@@ -7369,6 +7375,13 @@
                                     </m:r>
                                   </m:e>
                                 </m:d>
+                                <m:r>
+                                  <a:rPr lang="en-US" sz="2400" b="0" i="1" smtClean="0">
+                                    <a:latin typeface="Cambria Math" panose="02040503050406030204" pitchFamily="18" charset="0"/>
+                                    <a:ea typeface="Cambria Math" panose="02040503050406030204" pitchFamily="18" charset="0"/>
+                                  </a:rPr>
+                                  <m:t>)</m:t>
+                                </m:r>
                               </m:oMath>
                             </m:oMathPara>
                           </a14:m>
@@ -7393,14 +7406,14 @@
               <p:nvPr>
                 <p:extLst>
                   <p:ext uri="{D42A27DB-BD31-4B8C-83A1-F6EECF244321}">
-                    <p14:modId xmlns:p14="http://schemas.microsoft.com/office/powerpoint/2010/main" val="1787365281"/>
+                    <p14:modId xmlns:p14="http://schemas.microsoft.com/office/powerpoint/2010/main" val="2805203420"/>
                   </p:ext>
                 </p:extLst>
               </p:nvPr>
             </p:nvGraphicFramePr>
             <p:xfrm>
-              <a:off x="15227707" y="8866385"/>
-              <a:ext cx="5661410" cy="3566160"/>
+              <a:off x="15012293" y="8790723"/>
+              <a:ext cx="5958578" cy="4316620"/>
             </p:xfrm>
             <a:graphic>
               <a:graphicData uri="http://schemas.openxmlformats.org/drawingml/2006/table">
@@ -7409,10 +7422,10 @@
                     <a:tableStyleId>{93296810-A885-4BE3-A3E7-6D5BEEA58F35}</a:tableStyleId>
                   </a:tblPr>
                   <a:tblGrid>
-                    <a:gridCol w="2946814"/>
-                    <a:gridCol w="2714596"/>
+                    <a:gridCol w="3101493"/>
+                    <a:gridCol w="2857085"/>
                   </a:tblGrid>
-                  <a:tr h="822960">
+                  <a:tr h="616660">
                     <a:tc>
                       <a:txBody>
                         <a:bodyPr/>
@@ -7442,7 +7455,7 @@
                       <a:tcPr/>
                     </a:tc>
                   </a:tr>
-                  <a:tr h="457200">
+                  <a:tr h="616660">
                     <a:tc>
                       <a:txBody>
                         <a:bodyPr/>
@@ -7475,13 +7488,13 @@
                         <a:blipFill rotWithShape="0">
                           <a:blip r:embed="rId5"/>
                           <a:stretch>
-                            <a:fillRect l="-108744" t="-189333" r="-897" b="-532000"/>
+                            <a:fillRect l="-108955" t="-105882" r="-853" b="-498039"/>
                           </a:stretch>
                         </a:blipFill>
                       </a:tcPr>
                     </a:tc>
                   </a:tr>
-                  <a:tr h="457200">
+                  <a:tr h="616660">
                     <a:tc>
                       <a:txBody>
                         <a:bodyPr/>
@@ -7514,13 +7527,13 @@
                         <a:blipFill rotWithShape="0">
                           <a:blip r:embed="rId5"/>
                           <a:stretch>
-                            <a:fillRect l="-108744" t="-289333" r="-897" b="-432000"/>
+                            <a:fillRect l="-108955" t="-207921" r="-853" b="-402970"/>
                           </a:stretch>
                         </a:blipFill>
                       </a:tcPr>
                     </a:tc>
                   </a:tr>
-                  <a:tr h="457200">
+                  <a:tr h="616660">
                     <a:tc>
                       <a:txBody>
                         <a:bodyPr/>
@@ -7553,13 +7566,13 @@
                         <a:blipFill rotWithShape="0">
                           <a:blip r:embed="rId5"/>
                           <a:stretch>
-                            <a:fillRect l="-108744" t="-384211" r="-897" b="-326316"/>
+                            <a:fillRect l="-108955" t="-307921" r="-853" b="-302970"/>
                           </a:stretch>
                         </a:blipFill>
                       </a:tcPr>
                     </a:tc>
                   </a:tr>
-                  <a:tr h="457200">
+                  <a:tr h="616660">
                     <a:tc>
                       <a:txBody>
                         <a:bodyPr/>
@@ -7592,13 +7605,13 @@
                         <a:blipFill rotWithShape="0">
                           <a:blip r:embed="rId5"/>
                           <a:stretch>
-                            <a:fillRect l="-108744" t="-490667" r="-897" b="-230667"/>
+                            <a:fillRect l="-108955" t="-407921" r="-853" b="-202970"/>
                           </a:stretch>
                         </a:blipFill>
                       </a:tcPr>
                     </a:tc>
                   </a:tr>
-                  <a:tr h="457200">
+                  <a:tr h="616660">
                     <a:tc>
                       <a:txBody>
                         <a:bodyPr/>
@@ -7631,13 +7644,13 @@
                         <a:blipFill rotWithShape="0">
                           <a:blip r:embed="rId5"/>
                           <a:stretch>
-                            <a:fillRect l="-108744" t="-590667" r="-897" b="-130667"/>
+                            <a:fillRect l="-108955" t="-502941" r="-853" b="-100980"/>
                           </a:stretch>
                         </a:blipFill>
                       </a:tcPr>
                     </a:tc>
                   </a:tr>
-                  <a:tr h="457200">
+                  <a:tr h="616660">
                     <a:tc>
                       <a:txBody>
                         <a:bodyPr/>
@@ -7670,7 +7683,7 @@
                         <a:blipFill rotWithShape="0">
                           <a:blip r:embed="rId5"/>
                           <a:stretch>
-                            <a:fillRect l="-108744" t="-690667" r="-897" b="-30667"/>
+                            <a:fillRect l="-108955" t="-608911" r="-853" b="-1980"/>
                           </a:stretch>
                         </a:blipFill>
                       </a:tcPr>
@@ -7684,16 +7697,16 @@
       </mc:AlternateContent>
       <p:grpSp>
         <p:nvGrpSpPr>
-          <p:cNvPr id="63" name="Groep 62"/>
+          <p:cNvPr id="15" name="Groep 14"/>
           <p:cNvGrpSpPr/>
           <p:nvPr/>
         </p:nvGrpSpPr>
         <p:grpSpPr>
           <a:xfrm>
-            <a:off x="3624987" y="8094470"/>
-            <a:ext cx="11226051" cy="623981"/>
-            <a:chOff x="15372332" y="8679978"/>
-            <a:chExt cx="5462018" cy="623981"/>
+            <a:off x="3706741" y="8018810"/>
+            <a:ext cx="11099273" cy="623981"/>
+            <a:chOff x="3624987" y="8094470"/>
+            <a:chExt cx="11099273" cy="623981"/>
           </a:xfrm>
         </p:grpSpPr>
         <p:sp>
@@ -7706,8 +7719,8 @@
           </p:nvSpPr>
           <p:spPr bwMode="auto">
             <a:xfrm>
-              <a:off x="15372332" y="8679978"/>
-              <a:ext cx="5462017" cy="623981"/>
+              <a:off x="3624987" y="8094470"/>
+              <a:ext cx="11099271" cy="623981"/>
             </a:xfrm>
             <a:prstGeom prst="flowChartProcess">
               <a:avLst/>
@@ -7846,8 +7859,8 @@
           </p:nvSpPr>
           <p:spPr bwMode="auto">
             <a:xfrm>
-              <a:off x="15372332" y="8679978"/>
-              <a:ext cx="5462018" cy="607326"/>
+              <a:off x="3624987" y="8094470"/>
+              <a:ext cx="11099273" cy="607326"/>
             </a:xfrm>
             <a:prstGeom prst="rect">
               <a:avLst/>
@@ -7990,13 +8003,6 @@
                 </a:rPr>
                 <a:t>Lexicon</a:t>
               </a:r>
-              <a:endParaRPr lang="nl-NL" altLang="en-US" sz="4000" b="1" dirty="0" smtClean="0">
-                <a:solidFill>
-                  <a:schemeClr val="bg1"/>
-                </a:solidFill>
-                <a:latin typeface="Calibri" panose="020F0502020204030204" pitchFamily="34" charset="0"/>
-                <a:ea typeface="ヒラギノ角ゴ Pro W3" pitchFamily="80" charset="-128"/>
-              </a:endParaRPr>
             </a:p>
           </p:txBody>
         </p:sp>
@@ -8009,7 +8015,7 @@
         </p:nvGrpSpPr>
         <p:grpSpPr>
           <a:xfrm>
-            <a:off x="3624987" y="19772568"/>
+            <a:off x="3706741" y="19787616"/>
             <a:ext cx="8488433" cy="1053401"/>
             <a:chOff x="3595984" y="19936524"/>
             <a:chExt cx="17264132" cy="1053401"/>
@@ -8376,7 +8382,7 @@
         </p:nvSpPr>
         <p:spPr bwMode="auto">
           <a:xfrm>
-            <a:off x="3625058" y="29421270"/>
+            <a:off x="3706817" y="29384942"/>
             <a:ext cx="17264059" cy="712874"/>
           </a:xfrm>
           <a:prstGeom prst="rect">
@@ -8599,36 +8605,6 @@
           </a:p>
         </p:txBody>
       </p:sp>
-      <p:pic>
-        <p:nvPicPr>
-          <p:cNvPr id="10" name="Afbeelding 9"/>
-          <p:cNvPicPr>
-            <a:picLocks noChangeAspect="1"/>
-          </p:cNvPicPr>
-          <p:nvPr/>
-        </p:nvPicPr>
-        <p:blipFill>
-          <a:blip r:embed="rId6">
-            <a:extLst>
-              <a:ext uri="{28A0092B-C50C-407E-A947-70E740481C1C}">
-                <a14:useLocalDpi xmlns:a14="http://schemas.microsoft.com/office/drawing/2010/main" val="0"/>
-              </a:ext>
-            </a:extLst>
-          </a:blip>
-          <a:stretch>
-            <a:fillRect/>
-          </a:stretch>
-        </p:blipFill>
-        <p:spPr>
-          <a:xfrm>
-            <a:off x="3624987" y="13355413"/>
-            <a:ext cx="11226050" cy="6177326"/>
-          </a:xfrm>
-          <a:prstGeom prst="rect">
-            <a:avLst/>
-          </a:prstGeom>
-        </p:spPr>
-      </p:pic>
       <p:sp>
         <p:nvSpPr>
           <p:cNvPr id="50" name="Rectangle 35"/>
@@ -8639,8 +8615,8 @@
         </p:nvSpPr>
         <p:spPr bwMode="auto">
           <a:xfrm>
-            <a:off x="15227708" y="12676850"/>
-            <a:ext cx="5630954" cy="6853614"/>
+            <a:off x="15012293" y="13280744"/>
+            <a:ext cx="5958578" cy="6315839"/>
           </a:xfrm>
           <a:prstGeom prst="rect">
             <a:avLst/>
@@ -8919,7 +8895,7 @@
         </p:nvSpPr>
         <p:spPr bwMode="auto">
           <a:xfrm>
-            <a:off x="12340860" y="20961857"/>
+            <a:off x="12422614" y="20976905"/>
             <a:ext cx="8526727" cy="2885596"/>
           </a:xfrm>
           <a:prstGeom prst="rect">
@@ -9070,8 +9046,26 @@
                 <a:latin typeface="+mj-lt"/>
                 <a:sym typeface="Wingdings" panose="05000000000000000000" pitchFamily="2" charset="2"/>
               </a:rPr>
-              <a:t>, lexicon voor de puzzel</a:t>
-            </a:r>
+              <a:t> (in het Engels)</a:t>
+            </a:r>
+            <a:r>
+              <a:rPr lang="nl-NL" altLang="en-US" sz="2400" dirty="0" smtClean="0">
+                <a:latin typeface="+mj-lt"/>
+                <a:sym typeface="Wingdings" panose="05000000000000000000" pitchFamily="2" charset="2"/>
+              </a:rPr>
+              <a:t> en het</a:t>
+            </a:r>
+            <a:r>
+              <a:rPr lang="nl-NL" altLang="en-US" sz="2400" dirty="0" smtClean="0">
+                <a:latin typeface="+mj-lt"/>
+                <a:sym typeface="Wingdings" panose="05000000000000000000" pitchFamily="2" charset="2"/>
+              </a:rPr>
+              <a:t> logigram-specifiek lexicon</a:t>
+            </a:r>
+            <a:endParaRPr lang="nl-NL" altLang="en-US" sz="2400" dirty="0" smtClean="0">
+              <a:latin typeface="+mj-lt"/>
+              <a:sym typeface="Wingdings" panose="05000000000000000000" pitchFamily="2" charset="2"/>
+            </a:endParaRPr>
           </a:p>
           <a:p>
             <a:pPr marL="0" indent="0" eaLnBrk="1" hangingPunct="1">
@@ -9157,10 +9151,6 @@
               </a:rPr>
               <a:t>: Vocabularium + Theorie in IDP</a:t>
             </a:r>
-            <a:endParaRPr lang="nl-NL" altLang="en-US" sz="2400" dirty="0" smtClean="0">
-              <a:latin typeface="+mj-lt"/>
-              <a:sym typeface="Wingdings" panose="05000000000000000000" pitchFamily="2" charset="2"/>
-            </a:endParaRPr>
           </a:p>
         </p:txBody>
       </p:sp>
@@ -9174,7 +9164,7 @@
         </p:nvSpPr>
         <p:spPr bwMode="auto">
           <a:xfrm>
-            <a:off x="12331934" y="24030266"/>
+            <a:off x="12413688" y="24045314"/>
             <a:ext cx="8526727" cy="5148899"/>
           </a:xfrm>
           <a:prstGeom prst="rect">
@@ -9429,13 +9419,13 @@
           <p:nvPr>
             <p:extLst>
               <p:ext uri="{D42A27DB-BD31-4B8C-83A1-F6EECF244321}">
-                <p14:modId xmlns:p14="http://schemas.microsoft.com/office/powerpoint/2010/main" val="2188146363"/>
+                <p14:modId xmlns:p14="http://schemas.microsoft.com/office/powerpoint/2010/main" val="1701064842"/>
               </p:ext>
             </p:extLst>
           </p:nvPr>
         </p:nvGraphicFramePr>
         <p:xfrm>
-          <a:off x="12478117" y="25151941"/>
+          <a:off x="12559871" y="25166989"/>
           <a:ext cx="8234360" cy="2905548"/>
         </p:xfrm>
         <a:graphic>
@@ -9445,8 +9435,8 @@
                 <a:tableStyleId>{93296810-A885-4BE3-A3E7-6D5BEEA58F35}</a:tableStyleId>
               </a:tblPr>
               <a:tblGrid>
-                <a:gridCol w="4117180"/>
-                <a:gridCol w="4117180"/>
+                <a:gridCol w="1598071"/>
+                <a:gridCol w="6636289"/>
               </a:tblGrid>
               <a:tr h="484258">
                 <a:tc>
@@ -9614,7 +9604,7 @@
         </p:nvSpPr>
         <p:spPr bwMode="auto">
           <a:xfrm>
-            <a:off x="3636698" y="20942115"/>
+            <a:off x="3718452" y="20957163"/>
             <a:ext cx="8476721" cy="8237050"/>
           </a:xfrm>
           <a:prstGeom prst="rect">
@@ -9744,12 +9734,15 @@
                 <a:latin typeface="+mj-lt"/>
                 <a:sym typeface="Wingdings" panose="05000000000000000000" pitchFamily="2" charset="2"/>
               </a:rPr>
-              <a:t>Substantieven en eigennamen introduceren een basistype</a:t>
-            </a:r>
-            <a:endParaRPr lang="nl-NL" altLang="en-US" sz="2400" dirty="0" smtClean="0">
-              <a:latin typeface="+mj-lt"/>
-              <a:sym typeface="Wingdings" panose="05000000000000000000" pitchFamily="2" charset="2"/>
-            </a:endParaRPr>
+              <a:t>Substantieven en eigennamen introduceren een </a:t>
+            </a:r>
+            <a:r>
+              <a:rPr lang="nl-NL" altLang="en-US" sz="2400" i="1" dirty="0" smtClean="0">
+                <a:latin typeface="+mj-lt"/>
+                <a:sym typeface="Wingdings" panose="05000000000000000000" pitchFamily="2" charset="2"/>
+              </a:rPr>
+              <a:t>basistype</a:t>
+            </a:r>
           </a:p>
           <a:p>
             <a:pPr marL="0" indent="0" eaLnBrk="1" hangingPunct="1">
@@ -9763,8 +9756,33 @@
                 <a:latin typeface="+mj-lt"/>
                 <a:sym typeface="Wingdings" panose="05000000000000000000" pitchFamily="2" charset="2"/>
               </a:rPr>
-              <a:t>Overgankelijke werkwoorden en voorzetsels introduceren een afgeleid type van 2 basistypes.</a:t>
-            </a:r>
+              <a:t>Overgankelijke werkwoorden en voorzetsels introduceren een </a:t>
+            </a:r>
+            <a:r>
+              <a:rPr lang="nl-NL" altLang="en-US" sz="2400" i="1" dirty="0" smtClean="0">
+                <a:latin typeface="+mj-lt"/>
+                <a:sym typeface="Wingdings" panose="05000000000000000000" pitchFamily="2" charset="2"/>
+              </a:rPr>
+              <a:t>afgeleid type</a:t>
+            </a:r>
+            <a:r>
+              <a:rPr lang="nl-NL" altLang="en-US" sz="2400" dirty="0" smtClean="0">
+                <a:latin typeface="+mj-lt"/>
+                <a:sym typeface="Wingdings" panose="05000000000000000000" pitchFamily="2" charset="2"/>
+              </a:rPr>
+              <a:t> </a:t>
+            </a:r>
+            <a:r>
+              <a:rPr lang="nl-NL" altLang="en-US" sz="2400" dirty="0" smtClean="0">
+                <a:latin typeface="+mj-lt"/>
+                <a:sym typeface="Wingdings" panose="05000000000000000000" pitchFamily="2" charset="2"/>
+              </a:rPr>
+              <a:t>(met 2 basistypes als argument).</a:t>
+            </a:r>
+            <a:endParaRPr lang="nl-NL" altLang="en-US" sz="2400" dirty="0" smtClean="0">
+              <a:latin typeface="+mj-lt"/>
+              <a:sym typeface="Wingdings" panose="05000000000000000000" pitchFamily="2" charset="2"/>
+            </a:endParaRPr>
           </a:p>
           <a:p>
             <a:pPr marL="0" indent="0" eaLnBrk="1" hangingPunct="1">
@@ -9802,8 +9820,47 @@
                 <a:latin typeface="+mj-lt"/>
                 <a:sym typeface="Wingdings" panose="05000000000000000000" pitchFamily="2" charset="2"/>
               </a:rPr>
-              <a:t>unificeren de werkwoorden en voorzetsels zo de basistypes. Verdere unificatie verloopt via vragen aan de gebruiker i.v.m. synonymie van woorden.</a:t>
-            </a:r>
+              <a:t>unificeren de </a:t>
+            </a:r>
+            <a:r>
+              <a:rPr lang="nl-NL" altLang="en-US" sz="2400" dirty="0" smtClean="0">
+                <a:latin typeface="+mj-lt"/>
+                <a:sym typeface="Wingdings" panose="05000000000000000000" pitchFamily="2" charset="2"/>
+              </a:rPr>
+              <a:t>woorden die meerdere keren voorkomen </a:t>
+            </a:r>
+            <a:r>
+              <a:rPr lang="nl-NL" altLang="en-US" sz="2400" dirty="0" smtClean="0">
+                <a:latin typeface="+mj-lt"/>
+                <a:sym typeface="Wingdings" panose="05000000000000000000" pitchFamily="2" charset="2"/>
+              </a:rPr>
+              <a:t>zo de </a:t>
+            </a:r>
+            <a:r>
+              <a:rPr lang="nl-NL" altLang="en-US" sz="2400" dirty="0" smtClean="0">
+                <a:latin typeface="+mj-lt"/>
+                <a:sym typeface="Wingdings" panose="05000000000000000000" pitchFamily="2" charset="2"/>
+              </a:rPr>
+              <a:t>types</a:t>
+            </a:r>
+            <a:r>
+              <a:rPr lang="nl-NL" altLang="en-US" sz="2400" dirty="0" smtClean="0">
+                <a:latin typeface="+mj-lt"/>
+                <a:sym typeface="Wingdings" panose="05000000000000000000" pitchFamily="2" charset="2"/>
+              </a:rPr>
+              <a:t>. Verdere unificatie verloopt via vragen aan de gebruiker i.v.m. synonymie van </a:t>
+            </a:r>
+            <a:r>
+              <a:rPr lang="nl-NL" altLang="en-US" sz="2400" dirty="0" smtClean="0">
+                <a:latin typeface="+mj-lt"/>
+                <a:sym typeface="Wingdings" panose="05000000000000000000" pitchFamily="2" charset="2"/>
+              </a:rPr>
+              <a:t>woorden.</a:t>
+            </a:r>
+            <a:endParaRPr lang="nl-NL" altLang="en-US" sz="2400" dirty="0" smtClean="0">
+              <a:latin typeface="+mj-lt"/>
+              <a:sym typeface="Wingdings" panose="05000000000000000000" pitchFamily="2" charset="2"/>
+            </a:endParaRPr>
           </a:p>
           <a:p>
             <a:pPr marL="0" indent="0" eaLnBrk="1" hangingPunct="1">
@@ -9836,14 +9893,7 @@
                 <a:latin typeface="+mj-lt"/>
                 <a:sym typeface="Wingdings" panose="05000000000000000000" pitchFamily="2" charset="2"/>
               </a:rPr>
-              <a:t> worden vertaald </a:t>
-            </a:r>
-            <a:r>
-              <a:rPr lang="nl-NL" altLang="en-US" sz="2400" dirty="0" smtClean="0">
-                <a:latin typeface="+mj-lt"/>
-                <a:sym typeface="Wingdings" panose="05000000000000000000" pitchFamily="2" charset="2"/>
-              </a:rPr>
-              <a:t>naar constanten van </a:t>
+              <a:t> worden vertaald naar constanten van </a:t>
             </a:r>
             <a:r>
               <a:rPr lang="nl-NL" altLang="en-US" sz="2400" dirty="0" err="1" smtClean="0">
@@ -9894,14 +9944,21 @@
                 <a:latin typeface="+mj-lt"/>
                 <a:sym typeface="Wingdings" panose="05000000000000000000" pitchFamily="2" charset="2"/>
               </a:rPr>
-              <a:t>Voorzetsel</a:t>
+              <a:t>Voorzetsels</a:t>
             </a:r>
             <a:r>
               <a:rPr lang="nl-NL" altLang="en-US" sz="2400" dirty="0" smtClean="0">
                 <a:latin typeface="+mj-lt"/>
                 <a:sym typeface="Wingdings" panose="05000000000000000000" pitchFamily="2" charset="2"/>
               </a:rPr>
-              <a:t> en </a:t>
+              <a:t> </a:t>
+            </a:r>
+            <a:r>
+              <a:rPr lang="nl-NL" altLang="en-US" sz="2400" dirty="0" smtClean="0">
+                <a:latin typeface="+mj-lt"/>
+                <a:sym typeface="Wingdings" panose="05000000000000000000" pitchFamily="2" charset="2"/>
+              </a:rPr>
+              <a:t>en </a:t>
             </a:r>
             <a:r>
               <a:rPr lang="nl-NL" altLang="en-US" sz="2400" b="1" dirty="0">
@@ -9922,7 +9979,21 @@
                 <a:latin typeface="+mj-lt"/>
                 <a:sym typeface="Wingdings" panose="05000000000000000000" pitchFamily="2" charset="2"/>
               </a:rPr>
-              <a:t> introduceren een predicaat.</a:t>
+              <a:t> introduceren een </a:t>
+            </a:r>
+            <a:r>
+              <a:rPr lang="nl-NL" altLang="en-US" sz="2400" dirty="0" smtClean="0">
+                <a:latin typeface="+mj-lt"/>
+                <a:sym typeface="Wingdings" panose="05000000000000000000" pitchFamily="2" charset="2"/>
+              </a:rPr>
+              <a:t>predicaat</a:t>
+            </a:r>
+            <a:r>
+              <a:rPr lang="nl-NL" altLang="en-US" sz="2400" dirty="0" smtClean="0">
+                <a:latin typeface="+mj-lt"/>
+                <a:sym typeface="Wingdings" panose="05000000000000000000" pitchFamily="2" charset="2"/>
+              </a:rPr>
+              <a:t>.</a:t>
             </a:r>
           </a:p>
           <a:p>
@@ -9995,6 +10066,66 @@
           </a:p>
         </p:txBody>
       </p:sp>
+      <p:pic>
+        <p:nvPicPr>
+          <p:cNvPr id="5" name="Afbeelding 4"/>
+          <p:cNvPicPr>
+            <a:picLocks noChangeAspect="1"/>
+          </p:cNvPicPr>
+          <p:nvPr/>
+        </p:nvPicPr>
+        <p:blipFill>
+          <a:blip r:embed="rId6">
+            <a:extLst>
+              <a:ext uri="{28A0092B-C50C-407E-A947-70E740481C1C}">
+                <a14:useLocalDpi xmlns:a14="http://schemas.microsoft.com/office/drawing/2010/main" val="0"/>
+              </a:ext>
+            </a:extLst>
+          </a:blip>
+          <a:stretch>
+            <a:fillRect/>
+          </a:stretch>
+        </p:blipFill>
+        <p:spPr>
+          <a:xfrm>
+            <a:off x="3718452" y="13280745"/>
+            <a:ext cx="11087560" cy="6315839"/>
+          </a:xfrm>
+          <a:prstGeom prst="rect">
+            <a:avLst/>
+          </a:prstGeom>
+        </p:spPr>
+      </p:pic>
+      <p:pic>
+        <p:nvPicPr>
+          <p:cNvPr id="43" name="Afbeelding 42"/>
+          <p:cNvPicPr>
+            <a:picLocks noChangeAspect="1"/>
+          </p:cNvPicPr>
+          <p:nvPr/>
+        </p:nvPicPr>
+        <p:blipFill>
+          <a:blip r:embed="rId7">
+            <a:extLst>
+              <a:ext uri="{28A0092B-C50C-407E-A947-70E740481C1C}">
+                <a14:useLocalDpi xmlns:a14="http://schemas.microsoft.com/office/drawing/2010/main" val="0"/>
+              </a:ext>
+            </a:extLst>
+          </a:blip>
+          <a:stretch>
+            <a:fillRect/>
+          </a:stretch>
+        </p:blipFill>
+        <p:spPr>
+          <a:xfrm>
+            <a:off x="17244540" y="2892749"/>
+            <a:ext cx="3726331" cy="3835394"/>
+          </a:xfrm>
+          <a:prstGeom prst="rect">
+            <a:avLst/>
+          </a:prstGeom>
+        </p:spPr>
+      </p:pic>
     </p:spTree>
   </p:cSld>
   <p:clrMapOvr>

</xml_diff>

<commit_message>
Add version 3 of poster
</commit_message>
<xml_diff>
--- a/poster/poster.pptx
+++ b/poster/poster.pptx
@@ -150,7 +150,7 @@
             <a:srgbClr val="A4A3A4"/>
           </p15:clr>
         </p15:guide>
-        <p15:guide id="3" orient="horz" pos="1824" userDrawn="1">
+        <p15:guide id="3" orient="horz" pos="1779" userDrawn="1">
           <p15:clr>
             <a:srgbClr val="A4A3A4"/>
           </p15:clr>
@@ -3169,7 +3169,19 @@
               <a:rPr lang="nl-NL" altLang="en-US" sz="2400" dirty="0" smtClean="0">
                 <a:latin typeface="+mj-lt"/>
               </a:rPr>
-              <a:t>-paradigma wordt een probleem gereduceerd tot een specificatie waarop verschillende inferenties worden uitgevoerd. Een formele specificatie is echter moeilijk te schrijven. Het automatisch vertalen van natuurlijke taal naar logica lost dit probleem op.</a:t>
+              <a:t>-paradigma wordt een probleem gereduceerd tot een specificatie waarop verschillende inferenties worden uitgevoerd. Een formele specificatie is echter </a:t>
+            </a:r>
+            <a:r>
+              <a:rPr lang="nl-NL" altLang="en-US" sz="2400" dirty="0" smtClean="0">
+                <a:latin typeface="+mj-lt"/>
+              </a:rPr>
+              <a:t>moeilijk te lezen en te schrijven</a:t>
+            </a:r>
+            <a:r>
+              <a:rPr lang="nl-NL" altLang="en-US" sz="2400" dirty="0" smtClean="0">
+                <a:latin typeface="+mj-lt"/>
+              </a:rPr>
+              <a:t>. Het automatisch vertalen van natuurlijke taal naar logica lost dit probleem op.</a:t>
             </a:r>
           </a:p>
           <a:p>
@@ -4520,8 +4532,8 @@
           </a:prstGeom>
         </p:spPr>
       </p:pic>
-      <mc:AlternateContent xmlns:mc="http://schemas.openxmlformats.org/markup-compatibility/2006">
-        <mc:Choice xmlns:a14="http://schemas.microsoft.com/office/drawing/2010/main" Requires="a14">
+      <mc:AlternateContent xmlns:mc="http://schemas.openxmlformats.org/markup-compatibility/2006" xmlns:a14="http://schemas.microsoft.com/office/drawing/2010/main">
+        <mc:Choice Requires="a14">
           <p:graphicFrame>
             <p:nvGraphicFramePr>
               <p:cNvPr id="4" name="Tabel 3"/>
@@ -4725,14 +4737,7 @@
                                     <a:latin typeface="Cambria Math" panose="02040503050406030204" pitchFamily="18" charset="0"/>
                                     <a:ea typeface="Cambria Math" panose="02040503050406030204" pitchFamily="18" charset="0"/>
                                   </a:rPr>
-                                  <m:t>)</m:t>
-                                </m:r>
-                                <m:r>
-                                  <a:rPr lang="en-US" sz="2400" b="0" i="1" smtClean="0">
-                                    <a:latin typeface="Cambria Math" panose="02040503050406030204" pitchFamily="18" charset="0"/>
-                                    <a:ea typeface="Cambria Math" panose="02040503050406030204" pitchFamily="18" charset="0"/>
-                                  </a:rPr>
-                                  <m:t> ∧ </m:t>
+                                  <m:t>) ∧ </m:t>
                                 </m:r>
                                 <m:r>
                                   <a:rPr lang="en-US" sz="2400" b="0" i="1" smtClean="0">
@@ -5668,7 +5673,7 @@
             </a:graphic>
           </p:graphicFrame>
         </mc:Choice>
-        <mc:Fallback>
+        <mc:Fallback xmlns="">
           <p:graphicFrame>
             <p:nvGraphicFramePr>
               <p:cNvPr id="4" name="Tabel 3"/>
@@ -6682,8 +6687,8 @@
           </p:txBody>
         </p:sp>
       </p:grpSp>
-      <mc:AlternateContent xmlns:mc="http://schemas.openxmlformats.org/markup-compatibility/2006">
-        <mc:Choice xmlns:a14="http://schemas.microsoft.com/office/drawing/2010/main" Requires="a14">
+      <mc:AlternateContent xmlns:mc="http://schemas.openxmlformats.org/markup-compatibility/2006" xmlns:a14="http://schemas.microsoft.com/office/drawing/2010/main">
+        <mc:Choice Requires="a14">
           <p:graphicFrame>
             <p:nvGraphicFramePr>
               <p:cNvPr id="7" name="Tabel 6"/>
@@ -7396,7 +7401,7 @@
             </a:graphic>
           </p:graphicFrame>
         </mc:Choice>
-        <mc:Fallback>
+        <mc:Fallback xmlns="">
           <p:graphicFrame>
             <p:nvGraphicFramePr>
               <p:cNvPr id="7" name="Tabel 6"/>
@@ -8374,239 +8379,6 @@
       </p:grpSp>
       <p:sp>
         <p:nvSpPr>
-          <p:cNvPr id="36" name="Rectangle 37"/>
-          <p:cNvSpPr>
-            <a:spLocks noChangeArrowheads="1"/>
-          </p:cNvSpPr>
-          <p:nvPr/>
-        </p:nvSpPr>
-        <p:spPr bwMode="auto">
-          <a:xfrm>
-            <a:off x="3706817" y="29384942"/>
-            <a:ext cx="17264059" cy="712874"/>
-          </a:xfrm>
-          <a:prstGeom prst="rect">
-            <a:avLst/>
-          </a:prstGeom>
-          <a:solidFill>
-            <a:schemeClr val="bg1"/>
-          </a:solidFill>
-          <a:ln w="9525" algn="ctr">
-            <a:solidFill>
-              <a:srgbClr val="C5B9B5"/>
-            </a:solidFill>
-            <a:miter lim="800000"/>
-            <a:headEnd/>
-            <a:tailEnd/>
-          </a:ln>
-        </p:spPr>
-        <p:txBody>
-          <a:bodyPr lIns="182773" tIns="91388" rIns="182773" bIns="91388"/>
-          <a:lstStyle>
-            <a:lvl1pPr marL="342900" indent="-342900" eaLnBrk="0" hangingPunct="0">
-              <a:defRPr sz="5800">
-                <a:solidFill>
-                  <a:schemeClr val="tx1"/>
-                </a:solidFill>
-                <a:latin typeface="Arial" panose="020B0604020202020204" pitchFamily="34" charset="0"/>
-              </a:defRPr>
-            </a:lvl1pPr>
-            <a:lvl2pPr marL="742950" indent="-285750" eaLnBrk="0" hangingPunct="0">
-              <a:defRPr sz="5800">
-                <a:solidFill>
-                  <a:schemeClr val="tx1"/>
-                </a:solidFill>
-                <a:latin typeface="Arial" panose="020B0604020202020204" pitchFamily="34" charset="0"/>
-              </a:defRPr>
-            </a:lvl2pPr>
-            <a:lvl3pPr marL="1143000" indent="-228600" eaLnBrk="0" hangingPunct="0">
-              <a:defRPr sz="5800">
-                <a:solidFill>
-                  <a:schemeClr val="tx1"/>
-                </a:solidFill>
-                <a:latin typeface="Arial" panose="020B0604020202020204" pitchFamily="34" charset="0"/>
-              </a:defRPr>
-            </a:lvl3pPr>
-            <a:lvl4pPr marL="1600200" indent="-228600" eaLnBrk="0" hangingPunct="0">
-              <a:defRPr sz="5800">
-                <a:solidFill>
-                  <a:schemeClr val="tx1"/>
-                </a:solidFill>
-                <a:latin typeface="Arial" panose="020B0604020202020204" pitchFamily="34" charset="0"/>
-              </a:defRPr>
-            </a:lvl4pPr>
-            <a:lvl5pPr marL="2057400" indent="-228600" eaLnBrk="0" hangingPunct="0">
-              <a:defRPr sz="5800">
-                <a:solidFill>
-                  <a:schemeClr val="tx1"/>
-                </a:solidFill>
-                <a:latin typeface="Arial" panose="020B0604020202020204" pitchFamily="34" charset="0"/>
-              </a:defRPr>
-            </a:lvl5pPr>
-            <a:lvl6pPr marL="2514600" indent="-228600" eaLnBrk="0" fontAlgn="base" hangingPunct="0">
-              <a:spcBef>
-                <a:spcPct val="0"/>
-              </a:spcBef>
-              <a:spcAft>
-                <a:spcPct val="0"/>
-              </a:spcAft>
-              <a:defRPr sz="5800">
-                <a:solidFill>
-                  <a:schemeClr val="tx1"/>
-                </a:solidFill>
-                <a:latin typeface="Arial" panose="020B0604020202020204" pitchFamily="34" charset="0"/>
-              </a:defRPr>
-            </a:lvl6pPr>
-            <a:lvl7pPr marL="2971800" indent="-228600" eaLnBrk="0" fontAlgn="base" hangingPunct="0">
-              <a:spcBef>
-                <a:spcPct val="0"/>
-              </a:spcBef>
-              <a:spcAft>
-                <a:spcPct val="0"/>
-              </a:spcAft>
-              <a:defRPr sz="5800">
-                <a:solidFill>
-                  <a:schemeClr val="tx1"/>
-                </a:solidFill>
-                <a:latin typeface="Arial" panose="020B0604020202020204" pitchFamily="34" charset="0"/>
-              </a:defRPr>
-            </a:lvl7pPr>
-            <a:lvl8pPr marL="3429000" indent="-228600" eaLnBrk="0" fontAlgn="base" hangingPunct="0">
-              <a:spcBef>
-                <a:spcPct val="0"/>
-              </a:spcBef>
-              <a:spcAft>
-                <a:spcPct val="0"/>
-              </a:spcAft>
-              <a:defRPr sz="5800">
-                <a:solidFill>
-                  <a:schemeClr val="tx1"/>
-                </a:solidFill>
-                <a:latin typeface="Arial" panose="020B0604020202020204" pitchFamily="34" charset="0"/>
-              </a:defRPr>
-            </a:lvl8pPr>
-            <a:lvl9pPr marL="3886200" indent="-228600" eaLnBrk="0" fontAlgn="base" hangingPunct="0">
-              <a:spcBef>
-                <a:spcPct val="0"/>
-              </a:spcBef>
-              <a:spcAft>
-                <a:spcPct val="0"/>
-              </a:spcAft>
-              <a:defRPr sz="5800">
-                <a:solidFill>
-                  <a:schemeClr val="tx1"/>
-                </a:solidFill>
-                <a:latin typeface="Arial" panose="020B0604020202020204" pitchFamily="34" charset="0"/>
-              </a:defRPr>
-            </a:lvl9pPr>
-          </a:lstStyle>
-          <a:p>
-            <a:pPr marL="0" indent="0" eaLnBrk="1" hangingPunct="1">
-              <a:defRPr/>
-            </a:pPr>
-            <a:r>
-              <a:rPr lang="en-US" altLang="en-US" sz="1800" dirty="0">
-                <a:latin typeface="Calibri" panose="020F0502020204030204" pitchFamily="34" charset="0"/>
-                <a:ea typeface="Tahoma" panose="020B0604030504040204" pitchFamily="34" charset="0"/>
-                <a:cs typeface="Calibri" panose="020F0502020204030204" pitchFamily="34" charset="0"/>
-              </a:rPr>
-              <a:t>P. Blackburn and J. </a:t>
-            </a:r>
-            <a:r>
-              <a:rPr lang="en-US" altLang="en-US" sz="1800" dirty="0" err="1">
-                <a:latin typeface="Calibri" panose="020F0502020204030204" pitchFamily="34" charset="0"/>
-                <a:ea typeface="Tahoma" panose="020B0604030504040204" pitchFamily="34" charset="0"/>
-                <a:cs typeface="Calibri" panose="020F0502020204030204" pitchFamily="34" charset="0"/>
-              </a:rPr>
-              <a:t>Bos</a:t>
-            </a:r>
-            <a:r>
-              <a:rPr lang="en-US" altLang="en-US" sz="1800" dirty="0">
-                <a:latin typeface="Calibri" panose="020F0502020204030204" pitchFamily="34" charset="0"/>
-                <a:ea typeface="Tahoma" panose="020B0604030504040204" pitchFamily="34" charset="0"/>
-                <a:cs typeface="Calibri" panose="020F0502020204030204" pitchFamily="34" charset="0"/>
-              </a:rPr>
-              <a:t>. Representation and inference for natural language. </a:t>
-            </a:r>
-            <a:r>
-              <a:rPr lang="en-US" altLang="en-US" sz="1800" dirty="0" smtClean="0">
-                <a:latin typeface="Calibri" panose="020F0502020204030204" pitchFamily="34" charset="0"/>
-                <a:ea typeface="Tahoma" panose="020B0604030504040204" pitchFamily="34" charset="0"/>
-                <a:cs typeface="Calibri" panose="020F0502020204030204" pitchFamily="34" charset="0"/>
-              </a:rPr>
-              <a:t>A first </a:t>
-            </a:r>
-            <a:r>
-              <a:rPr lang="en-US" altLang="en-US" sz="1800" dirty="0">
-                <a:latin typeface="Calibri" panose="020F0502020204030204" pitchFamily="34" charset="0"/>
-                <a:ea typeface="Tahoma" panose="020B0604030504040204" pitchFamily="34" charset="0"/>
-                <a:cs typeface="Calibri" panose="020F0502020204030204" pitchFamily="34" charset="0"/>
-              </a:rPr>
-              <a:t>course in computational semantics. CSLI, 2005.</a:t>
-            </a:r>
-          </a:p>
-          <a:p>
-            <a:pPr marL="0" indent="0" eaLnBrk="1" hangingPunct="1">
-              <a:defRPr/>
-            </a:pPr>
-            <a:r>
-              <a:rPr lang="en-US" altLang="en-US" sz="1800" dirty="0" smtClean="0">
-                <a:latin typeface="Calibri" panose="020F0502020204030204" pitchFamily="34" charset="0"/>
-                <a:ea typeface="Tahoma" panose="020B0604030504040204" pitchFamily="34" charset="0"/>
-                <a:cs typeface="Calibri" panose="020F0502020204030204" pitchFamily="34" charset="0"/>
-              </a:rPr>
-              <a:t>P</a:t>
-            </a:r>
-            <a:r>
-              <a:rPr lang="en-US" altLang="en-US" sz="1800" dirty="0">
-                <a:latin typeface="Calibri" panose="020F0502020204030204" pitchFamily="34" charset="0"/>
-                <a:ea typeface="Tahoma" panose="020B0604030504040204" pitchFamily="34" charset="0"/>
-                <a:cs typeface="Calibri" panose="020F0502020204030204" pitchFamily="34" charset="0"/>
-              </a:rPr>
-              <a:t>. Blackburn and J. </a:t>
-            </a:r>
-            <a:r>
-              <a:rPr lang="en-US" altLang="en-US" sz="1800" dirty="0" err="1">
-                <a:latin typeface="Calibri" panose="020F0502020204030204" pitchFamily="34" charset="0"/>
-                <a:ea typeface="Tahoma" panose="020B0604030504040204" pitchFamily="34" charset="0"/>
-                <a:cs typeface="Calibri" panose="020F0502020204030204" pitchFamily="34" charset="0"/>
-              </a:rPr>
-              <a:t>Bos</a:t>
-            </a:r>
-            <a:r>
-              <a:rPr lang="en-US" altLang="en-US" sz="1800" dirty="0">
-                <a:latin typeface="Calibri" panose="020F0502020204030204" pitchFamily="34" charset="0"/>
-                <a:ea typeface="Tahoma" panose="020B0604030504040204" pitchFamily="34" charset="0"/>
-                <a:cs typeface="Calibri" panose="020F0502020204030204" pitchFamily="34" charset="0"/>
-              </a:rPr>
-              <a:t>. Working with discourse representation theory. </a:t>
-            </a:r>
-            <a:r>
-              <a:rPr lang="en-US" altLang="en-US" sz="1800" dirty="0" smtClean="0">
-                <a:latin typeface="Calibri" panose="020F0502020204030204" pitchFamily="34" charset="0"/>
-                <a:ea typeface="Tahoma" panose="020B0604030504040204" pitchFamily="34" charset="0"/>
-                <a:cs typeface="Calibri" panose="020F0502020204030204" pitchFamily="34" charset="0"/>
-              </a:rPr>
-              <a:t>An Advanced </a:t>
-            </a:r>
-            <a:r>
-              <a:rPr lang="en-US" altLang="en-US" sz="1800" dirty="0">
-                <a:latin typeface="Calibri" panose="020F0502020204030204" pitchFamily="34" charset="0"/>
-                <a:ea typeface="Tahoma" panose="020B0604030504040204" pitchFamily="34" charset="0"/>
-                <a:cs typeface="Calibri" panose="020F0502020204030204" pitchFamily="34" charset="0"/>
-              </a:rPr>
-              <a:t>Course in Computational Semantics, 2006.</a:t>
-            </a:r>
-            <a:endParaRPr lang="en-US" altLang="en-US" sz="1800" dirty="0" smtClean="0">
-              <a:latin typeface="Calibri" panose="020F0502020204030204" pitchFamily="34" charset="0"/>
-              <a:ea typeface="Tahoma" panose="020B0604030504040204" pitchFamily="34" charset="0"/>
-              <a:cs typeface="Calibri" panose="020F0502020204030204" pitchFamily="34" charset="0"/>
-            </a:endParaRPr>
-          </a:p>
-        </p:txBody>
-      </p:sp>
-      <p:sp>
-        <p:nvSpPr>
           <p:cNvPr id="50" name="Rectangle 35"/>
           <p:cNvSpPr>
             <a:spLocks noChangeArrowheads="1"/>
@@ -8771,8 +8543,33 @@
                 <a:latin typeface="+mj-lt"/>
                 <a:sym typeface="Wingdings" panose="05000000000000000000" pitchFamily="2" charset="2"/>
               </a:rPr>
-              <a:t>(Blackburn et. Al 2005, 2006)</a:t>
-            </a:r>
+              <a:t>(Blackburn </a:t>
+            </a:r>
+            <a:r>
+              <a:rPr lang="nl-NL" altLang="en-US" sz="2000" dirty="0" smtClean="0">
+                <a:latin typeface="+mj-lt"/>
+                <a:sym typeface="Wingdings" panose="05000000000000000000" pitchFamily="2" charset="2"/>
+              </a:rPr>
+              <a:t>en Bos </a:t>
+            </a:r>
+            <a:r>
+              <a:rPr lang="nl-NL" altLang="en-US" sz="2000" dirty="0" smtClean="0">
+                <a:latin typeface="+mj-lt"/>
+                <a:sym typeface="Wingdings" panose="05000000000000000000" pitchFamily="2" charset="2"/>
+              </a:rPr>
+              <a:t>2005, 2006</a:t>
+            </a:r>
+            <a:r>
+              <a:rPr lang="nl-NL" altLang="en-US" sz="2000" dirty="0" smtClean="0">
+                <a:latin typeface="+mj-lt"/>
+                <a:sym typeface="Wingdings" panose="05000000000000000000" pitchFamily="2" charset="2"/>
+              </a:rPr>
+              <a:t>)</a:t>
+            </a:r>
+            <a:endParaRPr lang="nl-NL" altLang="en-US" sz="2000" dirty="0" smtClean="0">
+              <a:latin typeface="+mj-lt"/>
+              <a:sym typeface="Wingdings" panose="05000000000000000000" pitchFamily="2" charset="2"/>
+            </a:endParaRPr>
           </a:p>
           <a:p>
             <a:pPr marL="0" indent="0" eaLnBrk="1" hangingPunct="1">
@@ -8781,24 +8578,26 @@
               </a:spcBef>
               <a:defRPr/>
             </a:pPr>
-            <a:endParaRPr lang="nl-NL" altLang="en-US" sz="2000" dirty="0" smtClean="0">
-              <a:latin typeface="+mj-lt"/>
-              <a:sym typeface="Wingdings" panose="05000000000000000000" pitchFamily="2" charset="2"/>
-            </a:endParaRPr>
-          </a:p>
-          <a:p>
-            <a:pPr marL="0" indent="0" eaLnBrk="1" hangingPunct="1">
-              <a:spcBef>
-                <a:spcPct val="20000"/>
-              </a:spcBef>
-              <a:defRPr/>
-            </a:pPr>
             <a:r>
               <a:rPr lang="nl-NL" altLang="en-US" sz="2400" dirty="0" smtClean="0">
                 <a:latin typeface="+mj-lt"/>
                 <a:sym typeface="Wingdings" panose="05000000000000000000" pitchFamily="2" charset="2"/>
               </a:rPr>
-              <a:t>Het lexicon is verschillend per logigram. De grammatica is gedeeld voor alle logigrammen.</a:t>
+              <a:t>Het lexicon is verschillend per logigram. De grammatica is </a:t>
+            </a:r>
+            <a:r>
+              <a:rPr lang="nl-NL" altLang="en-US" sz="2400" dirty="0" smtClean="0">
+                <a:latin typeface="+mj-lt"/>
+                <a:sym typeface="Wingdings" panose="05000000000000000000" pitchFamily="2" charset="2"/>
+              </a:rPr>
+              <a:t>dezelfde voor </a:t>
+            </a:r>
+            <a:r>
+              <a:rPr lang="nl-NL" altLang="en-US" sz="2400" dirty="0" smtClean="0">
+                <a:latin typeface="+mj-lt"/>
+                <a:sym typeface="Wingdings" panose="05000000000000000000" pitchFamily="2" charset="2"/>
+              </a:rPr>
+              <a:t>alle logigrammen.</a:t>
             </a:r>
           </a:p>
           <a:p>
@@ -8868,8 +8667,33 @@
                 <a:latin typeface="+mj-lt"/>
                 <a:sym typeface="Wingdings" panose="05000000000000000000" pitchFamily="2" charset="2"/>
               </a:rPr>
-              <a:t>Compositionaliteit: de betekenis van een woordgroep is een combinatie van de betekenissen van de woorden waaruit ze bestaat. Zo wordt de betekenis van de woorden naar boven toe gepropageerd.</a:t>
-            </a:r>
+              <a:t>Compositionaliteit: de betekenis van een woordgroep is een combinatie van de betekenissen van de woorden waaruit ze bestaat. Zo wordt de betekenis van de woorden naar boven toe </a:t>
+            </a:r>
+            <a:r>
+              <a:rPr lang="nl-NL" altLang="en-US" sz="2400" dirty="0" smtClean="0">
+                <a:latin typeface="+mj-lt"/>
+                <a:sym typeface="Wingdings" panose="05000000000000000000" pitchFamily="2" charset="2"/>
+              </a:rPr>
+              <a:t>gepropageerd in de </a:t>
+            </a:r>
+            <a:r>
+              <a:rPr lang="nl-NL" altLang="en-US" sz="2400" dirty="0" err="1" smtClean="0">
+                <a:latin typeface="+mj-lt"/>
+                <a:sym typeface="Wingdings" panose="05000000000000000000" pitchFamily="2" charset="2"/>
+              </a:rPr>
+              <a:t>parse</a:t>
+            </a:r>
+            <a:r>
+              <a:rPr lang="nl-NL" altLang="en-US" sz="2400" dirty="0" smtClean="0">
+                <a:latin typeface="+mj-lt"/>
+                <a:sym typeface="Wingdings" panose="05000000000000000000" pitchFamily="2" charset="2"/>
+              </a:rPr>
+              <a:t> tree</a:t>
+            </a:r>
+            <a:endParaRPr lang="nl-NL" altLang="en-US" sz="2400" dirty="0" smtClean="0">
+              <a:latin typeface="+mj-lt"/>
+              <a:sym typeface="Wingdings" panose="05000000000000000000" pitchFamily="2" charset="2"/>
+            </a:endParaRPr>
           </a:p>
           <a:p>
             <a:pPr marL="0" indent="0" eaLnBrk="1" hangingPunct="1">
@@ -9032,7 +8856,21 @@
                 <a:latin typeface="+mj-lt"/>
                 <a:sym typeface="Wingdings" panose="05000000000000000000" pitchFamily="2" charset="2"/>
               </a:rPr>
-              <a:t>: Aantal types, de </a:t>
+              <a:t>: Aantal </a:t>
+            </a:r>
+            <a:r>
+              <a:rPr lang="nl-NL" altLang="en-US" sz="2400" dirty="0" smtClean="0">
+                <a:latin typeface="+mj-lt"/>
+                <a:sym typeface="Wingdings" panose="05000000000000000000" pitchFamily="2" charset="2"/>
+              </a:rPr>
+              <a:t>(basis)types</a:t>
+            </a:r>
+            <a:r>
+              <a:rPr lang="nl-NL" altLang="en-US" sz="2400" dirty="0" smtClean="0">
+                <a:latin typeface="+mj-lt"/>
+                <a:sym typeface="Wingdings" panose="05000000000000000000" pitchFamily="2" charset="2"/>
+              </a:rPr>
+              <a:t>, de </a:t>
             </a:r>
             <a:r>
               <a:rPr lang="nl-NL" altLang="en-US" sz="2400" dirty="0" err="1" smtClean="0">
@@ -9046,26 +8884,8 @@
                 <a:latin typeface="+mj-lt"/>
                 <a:sym typeface="Wingdings" panose="05000000000000000000" pitchFamily="2" charset="2"/>
               </a:rPr>
-              <a:t> (in het Engels)</a:t>
-            </a:r>
-            <a:r>
-              <a:rPr lang="nl-NL" altLang="en-US" sz="2400" dirty="0" smtClean="0">
-                <a:latin typeface="+mj-lt"/>
-                <a:sym typeface="Wingdings" panose="05000000000000000000" pitchFamily="2" charset="2"/>
-              </a:rPr>
-              <a:t> en het</a:t>
-            </a:r>
-            <a:r>
-              <a:rPr lang="nl-NL" altLang="en-US" sz="2400" dirty="0" smtClean="0">
-                <a:latin typeface="+mj-lt"/>
-                <a:sym typeface="Wingdings" panose="05000000000000000000" pitchFamily="2" charset="2"/>
-              </a:rPr>
-              <a:t> logigram-specifiek lexicon</a:t>
-            </a:r>
-            <a:endParaRPr lang="nl-NL" altLang="en-US" sz="2400" dirty="0" smtClean="0">
-              <a:latin typeface="+mj-lt"/>
-              <a:sym typeface="Wingdings" panose="05000000000000000000" pitchFamily="2" charset="2"/>
-            </a:endParaRPr>
+              <a:t> (in het Engels) en het logigram-specifiek lexicon</a:t>
+            </a:r>
           </a:p>
           <a:p>
             <a:pPr marL="0" indent="0" eaLnBrk="1" hangingPunct="1">
@@ -9164,8 +8984,8 @@
         </p:nvSpPr>
         <p:spPr bwMode="auto">
           <a:xfrm>
-            <a:off x="12413688" y="24045314"/>
-            <a:ext cx="8526727" cy="5148899"/>
+            <a:off x="12413688" y="24045315"/>
+            <a:ext cx="8526727" cy="1889392"/>
           </a:xfrm>
           <a:prstGeom prst="rect">
             <a:avLst/>
@@ -9290,12 +9110,119 @@
               <a:defRPr/>
             </a:pPr>
             <a:r>
+              <a:rPr lang="nl-NL" altLang="en-US" sz="2400" b="1" dirty="0" smtClean="0">
+                <a:latin typeface="+mj-lt"/>
+                <a:sym typeface="Wingdings" panose="05000000000000000000" pitchFamily="2" charset="2"/>
+              </a:rPr>
+              <a:t>Experiment</a:t>
+            </a:r>
+            <a:r>
               <a:rPr lang="nl-NL" altLang="en-US" sz="2400" dirty="0" smtClean="0">
                 <a:latin typeface="+mj-lt"/>
                 <a:sym typeface="Wingdings" panose="05000000000000000000" pitchFamily="2" charset="2"/>
               </a:rPr>
-              <a:t>Met een grammatica op basis van … puzzels toegepast op … nieuwe puzzels</a:t>
-            </a:r>
+              <a:t>: Grammatica </a:t>
+            </a:r>
+            <a:r>
+              <a:rPr lang="nl-NL" altLang="en-US" sz="2400" dirty="0" smtClean="0">
+                <a:latin typeface="+mj-lt"/>
+                <a:sym typeface="Wingdings" panose="05000000000000000000" pitchFamily="2" charset="2"/>
+              </a:rPr>
+              <a:t>op basis </a:t>
+            </a:r>
+            <a:r>
+              <a:rPr lang="nl-NL" altLang="en-US" sz="2400" dirty="0" smtClean="0">
+                <a:latin typeface="+mj-lt"/>
+                <a:sym typeface="Wingdings" panose="05000000000000000000" pitchFamily="2" charset="2"/>
+              </a:rPr>
+              <a:t>van 10 puzzels</a:t>
+            </a:r>
+          </a:p>
+          <a:p>
+            <a:pPr marL="0" indent="0" eaLnBrk="1" hangingPunct="1">
+              <a:spcBef>
+                <a:spcPct val="20000"/>
+              </a:spcBef>
+              <a:defRPr/>
+            </a:pPr>
+            <a:r>
+              <a:rPr lang="nl-NL" altLang="en-US" sz="2400" b="1" dirty="0" smtClean="0">
+                <a:latin typeface="+mj-lt"/>
+                <a:sym typeface="Wingdings" panose="05000000000000000000" pitchFamily="2" charset="2"/>
+              </a:rPr>
+              <a:t>Evaluatie</a:t>
+            </a:r>
+            <a:r>
+              <a:rPr lang="nl-NL" altLang="en-US" sz="2400" dirty="0" smtClean="0">
+                <a:latin typeface="+mj-lt"/>
+                <a:sym typeface="Wingdings" panose="05000000000000000000" pitchFamily="2" charset="2"/>
+              </a:rPr>
+              <a:t>: 10 </a:t>
+            </a:r>
+            <a:r>
+              <a:rPr lang="nl-NL" altLang="en-US" sz="2400" dirty="0" smtClean="0">
+                <a:latin typeface="+mj-lt"/>
+                <a:sym typeface="Wingdings" panose="05000000000000000000" pitchFamily="2" charset="2"/>
+              </a:rPr>
+              <a:t>nieuwe </a:t>
+            </a:r>
+            <a:r>
+              <a:rPr lang="nl-NL" altLang="en-US" sz="2400" dirty="0" smtClean="0">
+                <a:latin typeface="+mj-lt"/>
+                <a:sym typeface="Wingdings" panose="05000000000000000000" pitchFamily="2" charset="2"/>
+              </a:rPr>
+              <a:t>puzzels allemaal vertaalbaar mits 84 (kleine) correcties aan de </a:t>
+            </a:r>
+            <a:r>
+              <a:rPr lang="nl-NL" altLang="en-US" sz="2400" dirty="0" err="1" smtClean="0">
+                <a:latin typeface="+mj-lt"/>
+                <a:sym typeface="Wingdings" panose="05000000000000000000" pitchFamily="2" charset="2"/>
+              </a:rPr>
+              <a:t>constraints</a:t>
+            </a:r>
+            <a:r>
+              <a:rPr lang="nl-NL" altLang="en-US" sz="2400" dirty="0" smtClean="0">
+                <a:latin typeface="+mj-lt"/>
+                <a:sym typeface="Wingdings" panose="05000000000000000000" pitchFamily="2" charset="2"/>
+              </a:rPr>
+              <a:t> in natuurlijke taal.</a:t>
+            </a:r>
+          </a:p>
+          <a:p>
+            <a:pPr marL="0" indent="0" eaLnBrk="1" hangingPunct="1">
+              <a:spcBef>
+                <a:spcPct val="20000"/>
+              </a:spcBef>
+              <a:defRPr/>
+            </a:pPr>
+            <a:r>
+              <a:rPr lang="nl-NL" altLang="en-US" sz="2400" b="1" dirty="0" smtClean="0">
+                <a:sym typeface="Wingdings" panose="05000000000000000000" pitchFamily="2" charset="2"/>
+              </a:rPr>
+              <a:t>Conclusie:</a:t>
+            </a:r>
+            <a:r>
+              <a:rPr lang="nl-NL" altLang="en-US" sz="2400" dirty="0" smtClean="0">
+                <a:sym typeface="Wingdings" panose="05000000000000000000" pitchFamily="2" charset="2"/>
+              </a:rPr>
+              <a:t> Succes mits beperking op gebruikte grammatica</a:t>
+            </a:r>
+            <a:endParaRPr lang="nl-NL" altLang="en-US" sz="2400" dirty="0" smtClean="0">
+              <a:latin typeface="+mj-lt"/>
+              <a:sym typeface="Wingdings" panose="05000000000000000000" pitchFamily="2" charset="2"/>
+            </a:endParaRPr>
+          </a:p>
+          <a:p>
+            <a:pPr marL="0" indent="0" eaLnBrk="1" hangingPunct="1">
+              <a:spcBef>
+                <a:spcPct val="20000"/>
+              </a:spcBef>
+              <a:defRPr/>
+            </a:pPr>
+            <a:endParaRPr lang="nl-NL" altLang="en-US" sz="2400" dirty="0" smtClean="0">
+              <a:latin typeface="+mj-lt"/>
+              <a:sym typeface="Wingdings" panose="05000000000000000000" pitchFamily="2" charset="2"/>
+            </a:endParaRPr>
           </a:p>
           <a:p>
             <a:pPr marL="0" indent="0" eaLnBrk="1" hangingPunct="1">
@@ -9400,13 +9327,10 @@
               </a:spcBef>
               <a:defRPr/>
             </a:pPr>
-            <a:r>
-              <a:rPr lang="nl-NL" altLang="en-US" sz="2400" dirty="0" smtClean="0">
-                <a:latin typeface="+mj-lt"/>
-                <a:sym typeface="Wingdings" panose="05000000000000000000" pitchFamily="2" charset="2"/>
-              </a:rPr>
-              <a:t>Conclusie: …</a:t>
-            </a:r>
+            <a:endParaRPr lang="nl-NL" altLang="en-US" sz="2400" dirty="0" smtClean="0">
+              <a:latin typeface="+mj-lt"/>
+              <a:sym typeface="Wingdings" panose="05000000000000000000" pitchFamily="2" charset="2"/>
+            </a:endParaRPr>
           </a:p>
         </p:txBody>
       </p:sp>
@@ -9419,14 +9343,14 @@
           <p:nvPr>
             <p:extLst>
               <p:ext uri="{D42A27DB-BD31-4B8C-83A1-F6EECF244321}">
-                <p14:modId xmlns:p14="http://schemas.microsoft.com/office/powerpoint/2010/main" val="1701064842"/>
+                <p14:modId xmlns:p14="http://schemas.microsoft.com/office/powerpoint/2010/main" val="3941126250"/>
               </p:ext>
             </p:extLst>
           </p:nvPr>
         </p:nvGraphicFramePr>
         <p:xfrm>
-          <a:off x="12559871" y="25166989"/>
-          <a:ext cx="8234360" cy="2905548"/>
+          <a:off x="12422613" y="26117521"/>
+          <a:ext cx="8517801" cy="3874064"/>
         </p:xfrm>
         <a:graphic>
           <a:graphicData uri="http://schemas.openxmlformats.org/drawingml/2006/table">
@@ -9435,8 +9359,9 @@
                 <a:tableStyleId>{93296810-A885-4BE3-A3E7-6D5BEEA58F35}</a:tableStyleId>
               </a:tblPr>
               <a:tblGrid>
-                <a:gridCol w="1598071"/>
-                <a:gridCol w="6636289"/>
+                <a:gridCol w="2569824"/>
+                <a:gridCol w="1042813"/>
+                <a:gridCol w="4905164"/>
               </a:tblGrid>
               <a:tr h="484258">
                 <a:tc>
@@ -9445,10 +9370,25 @@
                     <a:lstStyle/>
                     <a:p>
                       <a:r>
-                        <a:rPr lang="nl-BE" dirty="0" smtClean="0"/>
-                        <a:t>Problemen</a:t>
+                        <a:rPr lang="nl-BE" sz="1800" dirty="0" smtClean="0"/>
+                        <a:t>Probleem</a:t>
                       </a:r>
-                      <a:endParaRPr lang="nl-BE" dirty="0"/>
+                      <a:endParaRPr lang="nl-BE" sz="1800" dirty="0"/>
+                    </a:p>
+                  </a:txBody>
+                  <a:tcPr/>
+                </a:tc>
+                <a:tc>
+                  <a:txBody>
+                    <a:bodyPr/>
+                    <a:lstStyle/>
+                    <a:p>
+                      <a:pPr algn="ctr"/>
+                      <a:r>
+                        <a:rPr lang="nl-BE" sz="1800" dirty="0" smtClean="0"/>
+                        <a:t>Aantal</a:t>
+                      </a:r>
+                      <a:endParaRPr lang="nl-BE" sz="1800" dirty="0"/>
                     </a:p>
                   </a:txBody>
                   <a:tcPr/>
@@ -9459,10 +9399,10 @@
                     <a:lstStyle/>
                     <a:p>
                       <a:r>
-                        <a:rPr lang="nl-BE" dirty="0" smtClean="0"/>
-                        <a:t>Aantal</a:t>
+                        <a:rPr lang="nl-BE" sz="1800" dirty="0" smtClean="0"/>
+                        <a:t>Voorbeeld</a:t>
                       </a:r>
-                      <a:endParaRPr lang="nl-BE" dirty="0"/>
+                      <a:endParaRPr lang="nl-BE" sz="1800" dirty="0"/>
                     </a:p>
                   </a:txBody>
                   <a:tcPr/>
@@ -9475,10 +9415,10 @@
                     <a:lstStyle/>
                     <a:p>
                       <a:r>
-                        <a:rPr lang="nl-BE" dirty="0" smtClean="0"/>
-                        <a:t>Geen</a:t>
+                        <a:rPr lang="nl-BE" sz="1800" dirty="0" smtClean="0"/>
+                        <a:t>Ontbrekende woorden</a:t>
                       </a:r>
-                      <a:endParaRPr lang="nl-BE" dirty="0"/>
+                      <a:endParaRPr lang="nl-BE" sz="1800" dirty="0"/>
                     </a:p>
                   </a:txBody>
                   <a:tcPr/>
@@ -9488,7 +9428,62 @@
                     <a:bodyPr/>
                     <a:lstStyle/>
                     <a:p>
-                      <a:endParaRPr lang="nl-BE" dirty="0"/>
+                      <a:pPr algn="ctr"/>
+                      <a:r>
+                        <a:rPr lang="nl-BE" sz="1800" dirty="0" smtClean="0"/>
+                        <a:t>6</a:t>
+                      </a:r>
+                      <a:endParaRPr lang="nl-BE" sz="1800" dirty="0"/>
+                    </a:p>
+                  </a:txBody>
+                  <a:tcPr/>
+                </a:tc>
+                <a:tc>
+                  <a:txBody>
+                    <a:bodyPr/>
+                    <a:lstStyle/>
+                    <a:p>
+                      <a:r>
+                        <a:rPr lang="nl-BE" sz="1800" dirty="0" smtClean="0"/>
+                        <a:t>John’s trip </a:t>
+                      </a:r>
+                      <a:r>
+                        <a:rPr lang="nl-BE" sz="1800" dirty="0" err="1" smtClean="0"/>
+                        <a:t>will</a:t>
+                      </a:r>
+                      <a:r>
+                        <a:rPr lang="nl-BE" sz="1800" dirty="0" smtClean="0"/>
+                        <a:t> begin </a:t>
+                      </a:r>
+                      <a:r>
+                        <a:rPr lang="nl-BE" sz="1800" dirty="0" err="1" smtClean="0"/>
+                        <a:t>before</a:t>
+                      </a:r>
+                      <a:r>
+                        <a:rPr lang="nl-BE" sz="1800" baseline="0" dirty="0" smtClean="0"/>
+                        <a:t> </a:t>
+                      </a:r>
+                      <a:r>
+                        <a:rPr lang="nl-BE" sz="1800" baseline="0" dirty="0" err="1" smtClean="0"/>
+                        <a:t>Janice’s</a:t>
+                      </a:r>
+                      <a:r>
+                        <a:rPr lang="nl-BE" sz="1800" baseline="0" dirty="0" smtClean="0"/>
+                        <a:t> </a:t>
+                      </a:r>
+                      <a:r>
+                        <a:rPr lang="nl-BE" sz="1800" baseline="0" dirty="0" smtClean="0">
+                          <a:solidFill>
+                            <a:srgbClr val="00B050"/>
+                          </a:solidFill>
+                        </a:rPr>
+                        <a:t>trip</a:t>
+                      </a:r>
+                      <a:endParaRPr lang="nl-BE" sz="1800" dirty="0">
+                        <a:solidFill>
+                          <a:srgbClr val="00B050"/>
+                        </a:solidFill>
+                      </a:endParaRPr>
                     </a:p>
                   </a:txBody>
                   <a:tcPr/>
@@ -9501,10 +9496,10 @@
                     <a:lstStyle/>
                     <a:p>
                       <a:r>
-                        <a:rPr lang="nl-BE" dirty="0" smtClean="0"/>
-                        <a:t>Datums</a:t>
+                        <a:rPr lang="nl-BE" sz="1800" dirty="0" smtClean="0"/>
+                        <a:t>Overtollige woorden</a:t>
                       </a:r>
-                      <a:endParaRPr lang="nl-BE" dirty="0"/>
+                      <a:endParaRPr lang="nl-BE" sz="1800" dirty="0"/>
                     </a:p>
                   </a:txBody>
                   <a:tcPr/>
@@ -9514,7 +9509,114 @@
                     <a:bodyPr/>
                     <a:lstStyle/>
                     <a:p>
-                      <a:endParaRPr lang="nl-BE"/>
+                      <a:pPr algn="ctr"/>
+                      <a:r>
+                        <a:rPr lang="nl-BE" sz="1800" dirty="0" smtClean="0"/>
+                        <a:t>7</a:t>
+                      </a:r>
+                      <a:endParaRPr lang="nl-BE" sz="1800" dirty="0"/>
+                    </a:p>
+                  </a:txBody>
+                  <a:tcPr/>
+                </a:tc>
+                <a:tc>
+                  <a:txBody>
+                    <a:bodyPr/>
+                    <a:lstStyle/>
+                    <a:p>
+                      <a:r>
+                        <a:rPr lang="nl-BE" sz="1800" dirty="0" err="1" smtClean="0">
+                          <a:solidFill>
+                            <a:schemeClr val="tx1"/>
+                          </a:solidFill>
+                        </a:rPr>
+                        <a:t>Wolfenden</a:t>
+                      </a:r>
+                      <a:r>
+                        <a:rPr lang="nl-BE" sz="1800" dirty="0" smtClean="0">
+                          <a:solidFill>
+                            <a:schemeClr val="tx1"/>
+                          </a:solidFill>
+                        </a:rPr>
+                        <a:t> was </a:t>
+                      </a:r>
+                      <a:r>
+                        <a:rPr lang="nl-BE" sz="1800" dirty="0" err="1" smtClean="0">
+                          <a:solidFill>
+                            <a:srgbClr val="FF0000"/>
+                          </a:solidFill>
+                        </a:rPr>
+                        <a:t>said</a:t>
+                      </a:r>
+                      <a:r>
+                        <a:rPr lang="nl-BE" sz="1800" dirty="0" smtClean="0">
+                          <a:solidFill>
+                            <a:srgbClr val="FF0000"/>
+                          </a:solidFill>
+                        </a:rPr>
+                        <a:t> </a:t>
+                      </a:r>
+                      <a:r>
+                        <a:rPr lang="nl-BE" sz="1800" dirty="0" err="1" smtClean="0">
+                          <a:solidFill>
+                            <a:srgbClr val="FF0000"/>
+                          </a:solidFill>
+                        </a:rPr>
+                        <a:t>to</a:t>
+                      </a:r>
+                      <a:r>
+                        <a:rPr lang="nl-BE" sz="1800" dirty="0" smtClean="0">
+                          <a:solidFill>
+                            <a:srgbClr val="FF0000"/>
+                          </a:solidFill>
+                        </a:rPr>
+                        <a:t> </a:t>
+                      </a:r>
+                      <a:r>
+                        <a:rPr lang="nl-BE" sz="1800" dirty="0" err="1" smtClean="0">
+                          <a:solidFill>
+                            <a:srgbClr val="FF0000"/>
+                          </a:solidFill>
+                        </a:rPr>
+                        <a:t>be</a:t>
+                      </a:r>
+                      <a:r>
+                        <a:rPr lang="nl-BE" sz="1800" dirty="0" smtClean="0">
+                          <a:solidFill>
+                            <a:schemeClr val="tx1"/>
+                          </a:solidFill>
+                        </a:rPr>
+                        <a:t> </a:t>
+                      </a:r>
+                      <a:r>
+                        <a:rPr lang="nl-BE" sz="1800" dirty="0" err="1" smtClean="0">
+                          <a:solidFill>
+                            <a:schemeClr val="tx1"/>
+                          </a:solidFill>
+                        </a:rPr>
+                        <a:t>haunted</a:t>
+                      </a:r>
+                      <a:r>
+                        <a:rPr lang="nl-BE" sz="1800" dirty="0" smtClean="0">
+                          <a:solidFill>
+                            <a:schemeClr val="tx1"/>
+                          </a:solidFill>
+                        </a:rPr>
+                        <a:t> </a:t>
+                      </a:r>
+                      <a:r>
+                        <a:rPr lang="nl-BE" sz="1800" dirty="0" err="1" smtClean="0">
+                          <a:solidFill>
+                            <a:schemeClr val="tx1"/>
+                          </a:solidFill>
+                        </a:rPr>
+                        <a:t>by</a:t>
+                      </a:r>
+                      <a:endParaRPr lang="nl-BE" sz="1800" dirty="0">
+                        <a:solidFill>
+                          <a:schemeClr val="tx1"/>
+                        </a:solidFill>
+                      </a:endParaRPr>
                     </a:p>
                   </a:txBody>
                   <a:tcPr/>
@@ -9527,10 +9629,18 @@
                     <a:lstStyle/>
                     <a:p>
                       <a:r>
-                        <a:rPr lang="nl-BE" dirty="0" smtClean="0"/>
-                        <a:t>…</a:t>
+                        <a:rPr lang="nl-BE" sz="1800" dirty="0" smtClean="0"/>
+                        <a:t>&gt; 1 type voor</a:t>
                       </a:r>
-                      <a:endParaRPr lang="nl-BE" dirty="0"/>
+                      <a:r>
+                        <a:rPr lang="nl-BE" sz="1800" baseline="0" dirty="0" smtClean="0"/>
+                        <a:t> 1</a:t>
+                      </a:r>
+                      <a:r>
+                        <a:rPr lang="nl-BE" sz="1800" dirty="0" smtClean="0"/>
+                        <a:t> woord</a:t>
+                      </a:r>
+                      <a:endParaRPr lang="nl-BE" sz="1800" dirty="0"/>
                     </a:p>
                   </a:txBody>
                   <a:tcPr/>
@@ -9540,7 +9650,82 @@
                     <a:bodyPr/>
                     <a:lstStyle/>
                     <a:p>
-                      <a:endParaRPr lang="nl-BE"/>
+                      <a:pPr algn="ctr"/>
+                      <a:r>
+                        <a:rPr lang="nl-BE" sz="1800" dirty="0" smtClean="0"/>
+                        <a:t>25</a:t>
+                      </a:r>
+                      <a:endParaRPr lang="nl-BE" sz="1800" dirty="0"/>
+                    </a:p>
+                  </a:txBody>
+                  <a:tcPr/>
+                </a:tc>
+                <a:tc>
+                  <a:txBody>
+                    <a:bodyPr/>
+                    <a:lstStyle/>
+                    <a:p>
+                      <a:r>
+                        <a:rPr lang="nl-BE" sz="1800" dirty="0" smtClean="0"/>
+                        <a:t>The</a:t>
+                      </a:r>
+                      <a:r>
+                        <a:rPr lang="nl-BE" sz="1800" baseline="0" dirty="0" smtClean="0"/>
+                        <a:t> trip </a:t>
+                      </a:r>
+                      <a:r>
+                        <a:rPr lang="nl-BE" sz="1800" baseline="0" dirty="0" smtClean="0">
+                          <a:solidFill>
+                            <a:srgbClr val="FF0000"/>
+                          </a:solidFill>
+                        </a:rPr>
+                        <a:t>starts </a:t>
+                      </a:r>
+                      <a:r>
+                        <a:rPr lang="nl-BE" sz="1800" baseline="0" dirty="0" err="1" smtClean="0">
+                          <a:solidFill>
+                            <a:srgbClr val="00B050"/>
+                          </a:solidFill>
+                        </a:rPr>
+                        <a:t>begins</a:t>
+                      </a:r>
+                      <a:r>
+                        <a:rPr lang="nl-BE" sz="1800" baseline="0" dirty="0" smtClean="0">
+                          <a:solidFill>
+                            <a:srgbClr val="00B050"/>
+                          </a:solidFill>
+                        </a:rPr>
+                        <a:t> </a:t>
+                      </a:r>
+                      <a:r>
+                        <a:rPr lang="nl-BE" sz="1800" baseline="0" dirty="0" smtClean="0">
+                          <a:solidFill>
+                            <a:schemeClr val="tx1"/>
+                          </a:solidFill>
+                        </a:rPr>
+                        <a:t>at 9 </a:t>
+                      </a:r>
+                      <a:r>
+                        <a:rPr lang="nl-BE" sz="1800" baseline="0" dirty="0" err="1" smtClean="0">
+                          <a:solidFill>
+                            <a:schemeClr val="tx1"/>
+                          </a:solidFill>
+                        </a:rPr>
+                        <a:t>and</a:t>
+                      </a:r>
+                      <a:r>
+                        <a:rPr lang="nl-BE" sz="1800" baseline="0" dirty="0" smtClean="0">
+                          <a:solidFill>
+                            <a:schemeClr val="tx1"/>
+                          </a:solidFill>
+                        </a:rPr>
+                        <a:t> starts at Kiev</a:t>
+                      </a:r>
+                      <a:endParaRPr lang="nl-BE" sz="1800" dirty="0">
+                        <a:solidFill>
+                          <a:schemeClr val="tx1"/>
+                        </a:solidFill>
+                      </a:endParaRPr>
                     </a:p>
                   </a:txBody>
                   <a:tcPr/>
@@ -9552,7 +9737,15 @@
                     <a:bodyPr/>
                     <a:lstStyle/>
                     <a:p>
-                      <a:endParaRPr lang="nl-BE"/>
+                      <a:r>
+                        <a:rPr lang="nl-BE" sz="1800" dirty="0" smtClean="0"/>
+                        <a:t>The </a:t>
+                      </a:r>
+                      <a:r>
+                        <a:rPr lang="nl-BE" sz="1800" dirty="0" err="1" smtClean="0"/>
+                        <a:t>one</a:t>
+                      </a:r>
+                      <a:endParaRPr lang="nl-BE" sz="1800" dirty="0"/>
                     </a:p>
                   </a:txBody>
                   <a:tcPr/>
@@ -9562,7 +9755,86 @@
                     <a:bodyPr/>
                     <a:lstStyle/>
                     <a:p>
-                      <a:endParaRPr lang="nl-BE"/>
+                      <a:pPr algn="ctr"/>
+                      <a:r>
+                        <a:rPr lang="nl-BE" sz="1800" dirty="0" smtClean="0"/>
+                        <a:t>15</a:t>
+                      </a:r>
+                      <a:endParaRPr lang="nl-BE" sz="1800" dirty="0"/>
+                    </a:p>
+                  </a:txBody>
+                  <a:tcPr/>
+                </a:tc>
+                <a:tc>
+                  <a:txBody>
+                    <a:bodyPr/>
+                    <a:lstStyle/>
+                    <a:p>
+                      <a:r>
+                        <a:rPr lang="nl-BE" sz="1800" dirty="0" smtClean="0"/>
+                        <a:t>… </a:t>
+                      </a:r>
+                      <a:r>
+                        <a:rPr lang="nl-BE" sz="1800" dirty="0" err="1" smtClean="0"/>
+                        <a:t>before</a:t>
+                      </a:r>
+                      <a:r>
+                        <a:rPr lang="nl-BE" sz="1800" dirty="0" smtClean="0"/>
+                        <a:t> </a:t>
+                      </a:r>
+                      <a:r>
+                        <a:rPr lang="nl-BE" sz="1800" dirty="0" err="1" smtClean="0"/>
+                        <a:t>the</a:t>
+                      </a:r>
+                      <a:r>
+                        <a:rPr lang="nl-BE" sz="1800" dirty="0" smtClean="0"/>
+                        <a:t> </a:t>
+                      </a:r>
+                      <a:r>
+                        <a:rPr lang="nl-BE" sz="1800" dirty="0" err="1" smtClean="0">
+                          <a:solidFill>
+                            <a:srgbClr val="FF0000"/>
+                          </a:solidFill>
+                        </a:rPr>
+                        <a:t>one</a:t>
+                      </a:r>
+                      <a:r>
+                        <a:rPr lang="nl-BE" sz="1800" dirty="0" smtClean="0">
+                          <a:solidFill>
+                            <a:srgbClr val="FF0000"/>
+                          </a:solidFill>
+                        </a:rPr>
+                        <a:t> </a:t>
+                      </a:r>
+                      <a:r>
+                        <a:rPr lang="nl-BE" sz="1800" dirty="0" smtClean="0">
+                          <a:solidFill>
+                            <a:srgbClr val="00B050"/>
+                          </a:solidFill>
+                        </a:rPr>
+                        <a:t>tour </a:t>
+                      </a:r>
+                      <a:r>
+                        <a:rPr lang="nl-BE" sz="1800" dirty="0" err="1" smtClean="0">
+                          <a:solidFill>
+                            <a:schemeClr val="tx1"/>
+                          </a:solidFill>
+                        </a:rPr>
+                        <a:t>starting</a:t>
+                      </a:r>
+                      <a:r>
+                        <a:rPr lang="nl-BE" sz="1800" dirty="0" smtClean="0">
+                          <a:solidFill>
+                            <a:schemeClr val="tx1"/>
+                          </a:solidFill>
+                        </a:rPr>
+                        <a:t> …</a:t>
+                      </a:r>
+                      <a:endParaRPr lang="nl-BE" sz="1800" dirty="0">
+                        <a:solidFill>
+                          <a:schemeClr val="tx1"/>
+                        </a:solidFill>
+                      </a:endParaRPr>
                     </a:p>
                   </a:txBody>
                   <a:tcPr/>
@@ -9574,7 +9846,15 @@
                     <a:bodyPr/>
                     <a:lstStyle/>
                     <a:p>
-                      <a:endParaRPr lang="nl-BE"/>
+                      <a:r>
+                        <a:rPr lang="nl-BE" sz="1800" dirty="0" smtClean="0"/>
+                        <a:t>Herschrijving</a:t>
+                      </a:r>
+                      <a:r>
+                        <a:rPr lang="nl-BE" sz="1800" baseline="0" dirty="0" smtClean="0"/>
+                        <a:t> NP</a:t>
+                      </a:r>
+                      <a:endParaRPr lang="nl-BE" sz="1800" dirty="0" smtClean="0"/>
                     </a:p>
                   </a:txBody>
                   <a:tcPr/>
@@ -9584,7 +9864,260 @@
                     <a:bodyPr/>
                     <a:lstStyle/>
                     <a:p>
-                      <a:endParaRPr lang="nl-BE" dirty="0"/>
+                      <a:pPr algn="ctr"/>
+                      <a:r>
+                        <a:rPr lang="nl-BE" sz="1800" dirty="0" smtClean="0"/>
+                        <a:t>18</a:t>
+                      </a:r>
+                      <a:endParaRPr lang="nl-BE" sz="1800" dirty="0"/>
+                    </a:p>
+                  </a:txBody>
+                  <a:tcPr/>
+                </a:tc>
+                <a:tc>
+                  <a:txBody>
+                    <a:bodyPr/>
+                    <a:lstStyle/>
+                    <a:p>
+                      <a:r>
+                        <a:rPr lang="nl-BE" sz="1800" dirty="0" smtClean="0"/>
+                        <a:t>The </a:t>
+                      </a:r>
+                      <a:r>
+                        <a:rPr lang="nl-BE" sz="1800" dirty="0" err="1" smtClean="0"/>
+                        <a:t>comet</a:t>
+                      </a:r>
+                      <a:r>
+                        <a:rPr lang="nl-BE" sz="1800" dirty="0" smtClean="0"/>
+                        <a:t> </a:t>
+                      </a:r>
+                      <a:r>
+                        <a:rPr lang="nl-BE" sz="1800" dirty="0" err="1" smtClean="0">
+                          <a:solidFill>
+                            <a:srgbClr val="FF0000"/>
+                          </a:solidFill>
+                        </a:rPr>
+                        <a:t>Parks</a:t>
+                      </a:r>
+                      <a:r>
+                        <a:rPr lang="nl-BE" sz="1800" dirty="0" smtClean="0">
+                          <a:solidFill>
+                            <a:srgbClr val="FF0000"/>
+                          </a:solidFill>
+                        </a:rPr>
+                        <a:t> </a:t>
+                      </a:r>
+                      <a:r>
+                        <a:rPr lang="nl-BE" sz="1800" dirty="0" err="1" smtClean="0"/>
+                        <a:t>discovered</a:t>
+                      </a:r>
+                      <a:r>
+                        <a:rPr lang="nl-BE" sz="1800" dirty="0" smtClean="0"/>
+                        <a:t> </a:t>
+                      </a:r>
+                      <a:r>
+                        <a:rPr lang="nl-BE" sz="1800" dirty="0" err="1" smtClean="0">
+                          <a:solidFill>
+                            <a:srgbClr val="00B050"/>
+                          </a:solidFill>
+                        </a:rPr>
+                        <a:t>by</a:t>
+                      </a:r>
+                      <a:r>
+                        <a:rPr lang="nl-BE" sz="1800" dirty="0" smtClean="0">
+                          <a:solidFill>
+                            <a:srgbClr val="00B050"/>
+                          </a:solidFill>
+                        </a:rPr>
+                        <a:t> </a:t>
+                      </a:r>
+                      <a:r>
+                        <a:rPr lang="nl-BE" sz="1800" dirty="0" err="1" smtClean="0">
+                          <a:solidFill>
+                            <a:srgbClr val="00B050"/>
+                          </a:solidFill>
+                        </a:rPr>
+                        <a:t>Parks</a:t>
+                      </a:r>
+                      <a:endParaRPr lang="nl-BE" sz="1800" dirty="0">
+                        <a:solidFill>
+                          <a:srgbClr val="00B050"/>
+                        </a:solidFill>
+                      </a:endParaRPr>
+                    </a:p>
+                  </a:txBody>
+                  <a:tcPr/>
+                </a:tc>
+              </a:tr>
+              <a:tr h="484258">
+                <a:tc>
+                  <a:txBody>
+                    <a:bodyPr/>
+                    <a:lstStyle/>
+                    <a:p>
+                      <a:r>
+                        <a:rPr lang="nl-BE" sz="1800" dirty="0" smtClean="0"/>
+                        <a:t>Type conversie</a:t>
+                      </a:r>
+                      <a:endParaRPr lang="nl-BE" sz="1800" dirty="0"/>
+                    </a:p>
+                  </a:txBody>
+                  <a:tcPr/>
+                </a:tc>
+                <a:tc>
+                  <a:txBody>
+                    <a:bodyPr/>
+                    <a:lstStyle/>
+                    <a:p>
+                      <a:pPr algn="ctr"/>
+                      <a:r>
+                        <a:rPr lang="nl-BE" sz="1800" dirty="0" smtClean="0"/>
+                        <a:t>3</a:t>
+                      </a:r>
+                      <a:endParaRPr lang="nl-BE" sz="1800" dirty="0"/>
+                    </a:p>
+                  </a:txBody>
+                  <a:tcPr/>
+                </a:tc>
+                <a:tc>
+                  <a:txBody>
+                    <a:bodyPr/>
+                    <a:lstStyle/>
+                    <a:p>
+                      <a:r>
+                        <a:rPr lang="nl-BE" sz="1800" dirty="0" smtClean="0"/>
+                        <a:t>John</a:t>
+                      </a:r>
+                      <a:r>
+                        <a:rPr lang="nl-BE" sz="1800" baseline="0" dirty="0" smtClean="0"/>
+                        <a:t> </a:t>
+                      </a:r>
+                      <a:r>
+                        <a:rPr lang="nl-BE" sz="1800" baseline="0" dirty="0" err="1" smtClean="0"/>
+                        <a:t>finished</a:t>
+                      </a:r>
+                      <a:r>
+                        <a:rPr lang="nl-BE" sz="1800" baseline="0" dirty="0" smtClean="0"/>
+                        <a:t> </a:t>
+                      </a:r>
+                      <a:r>
+                        <a:rPr lang="nl-BE" sz="1800" baseline="0" dirty="0" err="1" smtClean="0"/>
+                        <a:t>before</a:t>
+                      </a:r>
+                      <a:r>
+                        <a:rPr lang="nl-BE" sz="1800" baseline="0" dirty="0" smtClean="0"/>
+                        <a:t> </a:t>
+                      </a:r>
+                      <a:r>
+                        <a:rPr lang="nl-BE" sz="1800" baseline="0" dirty="0" err="1" smtClean="0">
+                          <a:solidFill>
+                            <a:schemeClr val="tx1"/>
+                          </a:solidFill>
+                        </a:rPr>
+                        <a:t>the</a:t>
+                      </a:r>
+                      <a:r>
+                        <a:rPr lang="nl-BE" sz="1800" baseline="0" dirty="0" smtClean="0">
+                          <a:solidFill>
+                            <a:schemeClr val="tx1"/>
+                          </a:solidFill>
+                        </a:rPr>
+                        <a:t> </a:t>
+                      </a:r>
+                      <a:r>
+                        <a:rPr lang="nl-BE" sz="1800" baseline="0" dirty="0" smtClean="0">
+                          <a:solidFill>
+                            <a:srgbClr val="00B050"/>
+                          </a:solidFill>
+                        </a:rPr>
+                        <a:t>man </a:t>
+                      </a:r>
+                      <a:r>
+                        <a:rPr lang="nl-BE" sz="1800" baseline="0" dirty="0" err="1" smtClean="0">
+                          <a:solidFill>
+                            <a:srgbClr val="00B050"/>
+                          </a:solidFill>
+                        </a:rPr>
+                        <a:t>acting</a:t>
+                      </a:r>
+                      <a:r>
+                        <a:rPr lang="nl-BE" sz="1800" baseline="0" dirty="0" smtClean="0">
+                          <a:solidFill>
+                            <a:srgbClr val="00B050"/>
+                          </a:solidFill>
+                        </a:rPr>
+                        <a:t> as</a:t>
+                      </a:r>
+                      <a:r>
+                        <a:rPr lang="nl-BE" sz="1800" baseline="0" dirty="0" smtClean="0"/>
+                        <a:t> doctor</a:t>
+                      </a:r>
+                      <a:endParaRPr lang="nl-BE" sz="1800" dirty="0"/>
+                    </a:p>
+                  </a:txBody>
+                  <a:tcPr/>
+                </a:tc>
+              </a:tr>
+              <a:tr h="484258">
+                <a:tc>
+                  <a:txBody>
+                    <a:bodyPr/>
+                    <a:lstStyle/>
+                    <a:p>
+                      <a:r>
+                        <a:rPr lang="nl-BE" sz="1800" dirty="0" smtClean="0"/>
+                        <a:t>Andere</a:t>
+                      </a:r>
+                      <a:endParaRPr lang="nl-BE" sz="1800" dirty="0"/>
+                    </a:p>
+                  </a:txBody>
+                  <a:tcPr/>
+                </a:tc>
+                <a:tc>
+                  <a:txBody>
+                    <a:bodyPr/>
+                    <a:lstStyle/>
+                    <a:p>
+                      <a:pPr algn="ctr"/>
+                      <a:r>
+                        <a:rPr lang="nl-BE" sz="1800" dirty="0" smtClean="0"/>
+                        <a:t>11</a:t>
+                      </a:r>
+                      <a:endParaRPr lang="nl-BE" sz="1800" dirty="0"/>
+                    </a:p>
+                  </a:txBody>
+                  <a:tcPr/>
+                </a:tc>
+                <a:tc>
+                  <a:txBody>
+                    <a:bodyPr/>
+                    <a:lstStyle/>
+                    <a:p>
+                      <a:r>
+                        <a:rPr lang="nl-BE" sz="1800" dirty="0" smtClean="0">
+                          <a:solidFill>
+                            <a:srgbClr val="00B050"/>
+                          </a:solidFill>
+                        </a:rPr>
+                        <a:t>$5.99</a:t>
+                      </a:r>
+                      <a:r>
+                        <a:rPr lang="nl-BE" sz="1800" baseline="0" dirty="0" smtClean="0"/>
+                        <a:t> </a:t>
+                      </a:r>
+                      <a:r>
+                        <a:rPr lang="nl-BE" sz="1800" baseline="0" dirty="0" smtClean="0">
+                          <a:solidFill>
+                            <a:srgbClr val="FF0000"/>
+                          </a:solidFill>
+                        </a:rPr>
+                        <a:t>$6</a:t>
+                      </a:r>
+                      <a:endParaRPr lang="nl-BE" sz="1800" dirty="0">
+                        <a:solidFill>
+                          <a:srgbClr val="FF0000"/>
+                        </a:solidFill>
+                      </a:endParaRPr>
                     </a:p>
                   </a:txBody>
                   <a:tcPr/>
@@ -9604,8 +10137,8 @@
         </p:nvSpPr>
         <p:spPr bwMode="auto">
           <a:xfrm>
-            <a:off x="3718452" y="20957163"/>
-            <a:ext cx="8476721" cy="8237050"/>
+            <a:off x="3718452" y="20957162"/>
+            <a:ext cx="8476721" cy="9034423"/>
           </a:xfrm>
           <a:prstGeom prst="rect">
             <a:avLst/>
@@ -9731,18 +10264,49 @@
             </a:pPr>
             <a:r>
               <a:rPr lang="nl-NL" altLang="en-US" sz="2400" dirty="0" smtClean="0">
-                <a:latin typeface="+mj-lt"/>
                 <a:sym typeface="Wingdings" panose="05000000000000000000" pitchFamily="2" charset="2"/>
               </a:rPr>
-              <a:t>Substantieven en eigennamen introduceren een </a:t>
-            </a:r>
-            <a:r>
-              <a:rPr lang="nl-NL" altLang="en-US" sz="2400" i="1" dirty="0" smtClean="0">
-                <a:latin typeface="+mj-lt"/>
+              <a:t>Veronderstelling: </a:t>
+            </a:r>
+            <a:r>
+              <a:rPr lang="nl-NL" altLang="en-US" sz="2400" b="1" dirty="0" smtClean="0">
                 <a:sym typeface="Wingdings" panose="05000000000000000000" pitchFamily="2" charset="2"/>
               </a:rPr>
-              <a:t>basistype</a:t>
-            </a:r>
+              <a:t>elk </a:t>
+            </a:r>
+            <a:r>
+              <a:rPr lang="nl-NL" altLang="en-US" sz="2400" b="1" dirty="0">
+                <a:sym typeface="Wingdings" panose="05000000000000000000" pitchFamily="2" charset="2"/>
+              </a:rPr>
+              <a:t>woord </a:t>
+            </a:r>
+            <a:r>
+              <a:rPr lang="nl-NL" altLang="en-US" sz="2400" dirty="0">
+                <a:sym typeface="Wingdings" panose="05000000000000000000" pitchFamily="2" charset="2"/>
+              </a:rPr>
+              <a:t>heeft </a:t>
+            </a:r>
+            <a:r>
+              <a:rPr lang="nl-NL" altLang="en-US" sz="2400" b="1" dirty="0">
+                <a:sym typeface="Wingdings" panose="05000000000000000000" pitchFamily="2" charset="2"/>
+              </a:rPr>
+              <a:t>1 type</a:t>
+            </a:r>
+            <a:r>
+              <a:rPr lang="nl-NL" altLang="en-US" sz="2400" dirty="0">
+                <a:sym typeface="Wingdings" panose="05000000000000000000" pitchFamily="2" charset="2"/>
+              </a:rPr>
+              <a:t> per </a:t>
+            </a:r>
+            <a:r>
+              <a:rPr lang="nl-NL" altLang="en-US" sz="2400" dirty="0" smtClean="0">
+                <a:sym typeface="Wingdings" panose="05000000000000000000" pitchFamily="2" charset="2"/>
+              </a:rPr>
+              <a:t>logigram. </a:t>
+            </a:r>
+            <a:endParaRPr lang="nl-NL" altLang="en-US" sz="2400" dirty="0" smtClean="0">
+              <a:sym typeface="Wingdings" panose="05000000000000000000" pitchFamily="2" charset="2"/>
+            </a:endParaRPr>
           </a:p>
           <a:p>
             <a:pPr marL="0" indent="0" eaLnBrk="1" hangingPunct="1">
@@ -9753,36 +10317,63 @@
             </a:pPr>
             <a:r>
               <a:rPr lang="nl-NL" altLang="en-US" sz="2400" dirty="0" smtClean="0">
+                <a:sym typeface="Wingdings" panose="05000000000000000000" pitchFamily="2" charset="2"/>
+              </a:rPr>
+              <a:t>Bij </a:t>
+            </a:r>
+            <a:r>
+              <a:rPr lang="nl-NL" altLang="en-US" sz="2400" dirty="0" smtClean="0">
+                <a:sym typeface="Wingdings" panose="05000000000000000000" pitchFamily="2" charset="2"/>
+              </a:rPr>
+              <a:t>meerdere </a:t>
+            </a:r>
+            <a:r>
+              <a:rPr lang="nl-NL" altLang="en-US" sz="2400" dirty="0" err="1" smtClean="0">
+                <a:sym typeface="Wingdings" panose="05000000000000000000" pitchFamily="2" charset="2"/>
+              </a:rPr>
+              <a:t>constraints</a:t>
+            </a:r>
+            <a:r>
+              <a:rPr lang="nl-NL" altLang="en-US" sz="2400" dirty="0" smtClean="0">
+                <a:sym typeface="Wingdings" panose="05000000000000000000" pitchFamily="2" charset="2"/>
+              </a:rPr>
+              <a:t> </a:t>
+            </a:r>
+            <a:r>
+              <a:rPr lang="nl-NL" altLang="en-US" sz="2400" b="1" dirty="0" smtClean="0">
                 <a:latin typeface="+mj-lt"/>
                 <a:sym typeface="Wingdings" panose="05000000000000000000" pitchFamily="2" charset="2"/>
               </a:rPr>
-              <a:t>Overgankelijke werkwoorden en voorzetsels introduceren een </a:t>
-            </a:r>
-            <a:r>
-              <a:rPr lang="nl-NL" altLang="en-US" sz="2400" i="1" dirty="0" smtClean="0">
-                <a:latin typeface="+mj-lt"/>
-                <a:sym typeface="Wingdings" panose="05000000000000000000" pitchFamily="2" charset="2"/>
-              </a:rPr>
-              <a:t>afgeleid type</a:t>
+              <a:t>unificeren</a:t>
             </a:r>
             <a:r>
               <a:rPr lang="nl-NL" altLang="en-US" sz="2400" dirty="0" smtClean="0">
                 <a:latin typeface="+mj-lt"/>
                 <a:sym typeface="Wingdings" panose="05000000000000000000" pitchFamily="2" charset="2"/>
               </a:rPr>
-              <a:t> </a:t>
+              <a:t> de woorden die meerdere keren </a:t>
             </a:r>
             <a:r>
               <a:rPr lang="nl-NL" altLang="en-US" sz="2400" dirty="0" smtClean="0">
                 <a:latin typeface="+mj-lt"/>
                 <a:sym typeface="Wingdings" panose="05000000000000000000" pitchFamily="2" charset="2"/>
               </a:rPr>
-              <a:t>(met 2 basistypes als argument).</a:t>
-            </a:r>
-            <a:endParaRPr lang="nl-NL" altLang="en-US" sz="2400" dirty="0" smtClean="0">
-              <a:latin typeface="+mj-lt"/>
-              <a:sym typeface="Wingdings" panose="05000000000000000000" pitchFamily="2" charset="2"/>
-            </a:endParaRPr>
+              <a:t>voorkomen </a:t>
+            </a:r>
+            <a:r>
+              <a:rPr lang="nl-NL" altLang="en-US" sz="2400" dirty="0" smtClean="0">
+                <a:latin typeface="+mj-lt"/>
+                <a:sym typeface="Wingdings" panose="05000000000000000000" pitchFamily="2" charset="2"/>
+              </a:rPr>
+              <a:t>de types. Verdere unificatie verloopt via vragen aan de gebruiker i.v.m. synonymie van woorden</a:t>
+            </a:r>
+            <a:r>
+              <a:rPr lang="nl-NL" altLang="en-US" sz="2400" dirty="0" smtClean="0">
+                <a:latin typeface="+mj-lt"/>
+                <a:sym typeface="Wingdings" panose="05000000000000000000" pitchFamily="2" charset="2"/>
+              </a:rPr>
+              <a:t>.</a:t>
+            </a:r>
           </a:p>
           <a:p>
             <a:pPr marL="0" indent="0" eaLnBrk="1" hangingPunct="1">
@@ -9795,67 +10386,51 @@
               <a:rPr lang="nl-NL" altLang="en-US" sz="2400" dirty="0">
                 <a:sym typeface="Wingdings" panose="05000000000000000000" pitchFamily="2" charset="2"/>
               </a:rPr>
-              <a:t>Veronderstelling: elk woord heeft 1 type per </a:t>
+              <a:t>Substantieven en eigennamen introduceren een </a:t>
+            </a:r>
+            <a:r>
+              <a:rPr lang="nl-NL" altLang="en-US" sz="2400" i="1" dirty="0">
+                <a:sym typeface="Wingdings" panose="05000000000000000000" pitchFamily="2" charset="2"/>
+              </a:rPr>
+              <a:t>basistype</a:t>
+            </a:r>
+          </a:p>
+          <a:p>
+            <a:pPr marL="0" indent="0" eaLnBrk="1" hangingPunct="1">
+              <a:spcBef>
+                <a:spcPct val="20000"/>
+              </a:spcBef>
+              <a:defRPr/>
+            </a:pPr>
+            <a:r>
+              <a:rPr lang="nl-NL" altLang="en-US" sz="2400" dirty="0">
+                <a:sym typeface="Wingdings" panose="05000000000000000000" pitchFamily="2" charset="2"/>
+              </a:rPr>
+              <a:t>Overgankelijke werkwoorden en voorzetsels introduceren een afgeleid </a:t>
+            </a:r>
+            <a:r>
+              <a:rPr lang="nl-NL" altLang="en-US" sz="2400" i="1" dirty="0" err="1">
+                <a:sym typeface="Wingdings" panose="05000000000000000000" pitchFamily="2" charset="2"/>
+              </a:rPr>
+              <a:t>tuple</a:t>
+            </a:r>
+            <a:r>
+              <a:rPr lang="nl-NL" altLang="en-US" sz="2400" i="1" dirty="0">
+                <a:sym typeface="Wingdings" panose="05000000000000000000" pitchFamily="2" charset="2"/>
+              </a:rPr>
+              <a:t>-type</a:t>
+            </a:r>
+            <a:r>
+              <a:rPr lang="nl-NL" altLang="en-US" sz="2400" dirty="0">
+                <a:sym typeface="Wingdings" panose="05000000000000000000" pitchFamily="2" charset="2"/>
+              </a:rPr>
+              <a:t> (met 2 basistypes als argument</a:t>
             </a:r>
             <a:r>
               <a:rPr lang="nl-NL" altLang="en-US" sz="2400" dirty="0" smtClean="0">
                 <a:sym typeface="Wingdings" panose="05000000000000000000" pitchFamily="2" charset="2"/>
               </a:rPr>
-              <a:t>logigram. Bij meerdere </a:t>
-            </a:r>
-            <a:r>
-              <a:rPr lang="nl-NL" altLang="en-US" sz="2400" dirty="0" err="1" smtClean="0">
-                <a:sym typeface="Wingdings" panose="05000000000000000000" pitchFamily="2" charset="2"/>
-              </a:rPr>
-              <a:t>constraints</a:t>
-            </a:r>
-            <a:r>
-              <a:rPr lang="nl-NL" altLang="en-US" sz="2400" dirty="0" smtClean="0">
-                <a:sym typeface="Wingdings" panose="05000000000000000000" pitchFamily="2" charset="2"/>
-              </a:rPr>
-              <a:t>, </a:t>
-            </a:r>
-            <a:r>
-              <a:rPr lang="nl-NL" altLang="en-US" sz="2400" dirty="0" smtClean="0">
-                <a:latin typeface="+mj-lt"/>
-                <a:sym typeface="Wingdings" panose="05000000000000000000" pitchFamily="2" charset="2"/>
-              </a:rPr>
-              <a:t>unificeren de </a:t>
-            </a:r>
-            <a:r>
-              <a:rPr lang="nl-NL" altLang="en-US" sz="2400" dirty="0" smtClean="0">
-                <a:latin typeface="+mj-lt"/>
-                <a:sym typeface="Wingdings" panose="05000000000000000000" pitchFamily="2" charset="2"/>
-              </a:rPr>
-              <a:t>woorden die meerdere keren voorkomen </a:t>
-            </a:r>
-            <a:r>
-              <a:rPr lang="nl-NL" altLang="en-US" sz="2400" dirty="0" smtClean="0">
-                <a:latin typeface="+mj-lt"/>
-                <a:sym typeface="Wingdings" panose="05000000000000000000" pitchFamily="2" charset="2"/>
-              </a:rPr>
-              <a:t>zo de </a:t>
-            </a:r>
-            <a:r>
-              <a:rPr lang="nl-NL" altLang="en-US" sz="2400" dirty="0" smtClean="0">
-                <a:latin typeface="+mj-lt"/>
-                <a:sym typeface="Wingdings" panose="05000000000000000000" pitchFamily="2" charset="2"/>
-              </a:rPr>
-              <a:t>types</a:t>
-            </a:r>
-            <a:r>
-              <a:rPr lang="nl-NL" altLang="en-US" sz="2400" dirty="0" smtClean="0">
-                <a:latin typeface="+mj-lt"/>
-                <a:sym typeface="Wingdings" panose="05000000000000000000" pitchFamily="2" charset="2"/>
-              </a:rPr>
-              <a:t>. Verdere unificatie verloopt via vragen aan de gebruiker i.v.m. synonymie van </a:t>
-            </a:r>
-            <a:r>
-              <a:rPr lang="nl-NL" altLang="en-US" sz="2400" dirty="0" smtClean="0">
-                <a:latin typeface="+mj-lt"/>
-                <a:sym typeface="Wingdings" panose="05000000000000000000" pitchFamily="2" charset="2"/>
-              </a:rPr>
-              <a:t>woorden.</a:t>
+              <a:t>).</a:t>
             </a:r>
             <a:endParaRPr lang="nl-NL" altLang="en-US" sz="2400" dirty="0" smtClean="0">
               <a:latin typeface="+mj-lt"/>
@@ -9882,18 +10457,11 @@
               <a:defRPr/>
             </a:pPr>
             <a:r>
-              <a:rPr lang="nl-NL" altLang="en-US" sz="2400" b="1" dirty="0" smtClean="0">
-                <a:latin typeface="+mj-lt"/>
-                <a:sym typeface="Wingdings" panose="05000000000000000000" pitchFamily="2" charset="2"/>
-              </a:rPr>
-              <a:t>Eigennamen</a:t>
-            </a:r>
-            <a:r>
               <a:rPr lang="nl-NL" altLang="en-US" sz="2400" dirty="0" smtClean="0">
                 <a:latin typeface="+mj-lt"/>
                 <a:sym typeface="Wingdings" panose="05000000000000000000" pitchFamily="2" charset="2"/>
               </a:rPr>
-              <a:t> worden vertaald naar constanten van </a:t>
+              <a:t>Eigennamen worden vertaald naar constanten van </a:t>
             </a:r>
             <a:r>
               <a:rPr lang="nl-NL" altLang="en-US" sz="2400" dirty="0" err="1" smtClean="0">
@@ -9907,8 +10475,33 @@
                 <a:latin typeface="+mj-lt"/>
                 <a:sym typeface="Wingdings" panose="05000000000000000000" pitchFamily="2" charset="2"/>
               </a:rPr>
-              <a:t> types. Door unificatie van de basistypes worden deze eigennamen gegroepeerd.</a:t>
-            </a:r>
+              <a:t> types. </a:t>
+            </a:r>
+            <a:r>
+              <a:rPr lang="nl-NL" altLang="en-US" sz="2400" dirty="0" smtClean="0">
+                <a:latin typeface="+mj-lt"/>
+                <a:sym typeface="Wingdings" panose="05000000000000000000" pitchFamily="2" charset="2"/>
+              </a:rPr>
+              <a:t>Door </a:t>
+            </a:r>
+            <a:r>
+              <a:rPr lang="nl-NL" altLang="en-US" sz="2400" dirty="0" smtClean="0">
+                <a:latin typeface="+mj-lt"/>
+                <a:sym typeface="Wingdings" panose="05000000000000000000" pitchFamily="2" charset="2"/>
+              </a:rPr>
+              <a:t>unificatie van de basistypes worden deze eigennamen gegroepeerd</a:t>
+            </a:r>
+            <a:r>
+              <a:rPr lang="nl-NL" altLang="en-US" sz="2400" dirty="0" smtClean="0">
+                <a:latin typeface="+mj-lt"/>
+                <a:sym typeface="Wingdings" panose="05000000000000000000" pitchFamily="2" charset="2"/>
+              </a:rPr>
+              <a:t>.</a:t>
+            </a:r>
+            <a:endParaRPr lang="nl-NL" altLang="en-US" sz="2400" dirty="0" smtClean="0">
+              <a:latin typeface="+mj-lt"/>
+              <a:sym typeface="Wingdings" panose="05000000000000000000" pitchFamily="2" charset="2"/>
+            </a:endParaRPr>
           </a:p>
           <a:p>
             <a:pPr marL="0" indent="0" eaLnBrk="1" hangingPunct="1">
@@ -9918,82 +10511,25 @@
               <a:defRPr/>
             </a:pPr>
             <a:r>
-              <a:rPr lang="nl-NL" altLang="en-US" sz="2400" b="1" dirty="0" smtClean="0">
-                <a:latin typeface="+mj-lt"/>
-                <a:sym typeface="Wingdings" panose="05000000000000000000" pitchFamily="2" charset="2"/>
-              </a:rPr>
-              <a:t>Substantieven</a:t>
-            </a:r>
-            <a:r>
               <a:rPr lang="nl-NL" altLang="en-US" sz="2400" dirty="0" smtClean="0">
                 <a:latin typeface="+mj-lt"/>
                 <a:sym typeface="Wingdings" panose="05000000000000000000" pitchFamily="2" charset="2"/>
               </a:rPr>
-              <a:t> geven een naam aan het type.</a:t>
-            </a:r>
-          </a:p>
-          <a:p>
-            <a:pPr marL="0" indent="0" eaLnBrk="1" hangingPunct="1">
-              <a:spcBef>
-                <a:spcPct val="20000"/>
-              </a:spcBef>
-              <a:defRPr/>
-            </a:pPr>
-            <a:r>
-              <a:rPr lang="nl-NL" altLang="en-US" sz="2400" b="1" dirty="0" smtClean="0">
+              <a:t>Voorzetsels en </a:t>
+            </a:r>
+            <a:r>
+              <a:rPr lang="nl-NL" altLang="en-US" sz="2400" dirty="0">
                 <a:latin typeface="+mj-lt"/>
                 <a:sym typeface="Wingdings" panose="05000000000000000000" pitchFamily="2" charset="2"/>
               </a:rPr>
-              <a:t>Voorzetsels</a:t>
+              <a:t>o</a:t>
             </a:r>
             <a:r>
               <a:rPr lang="nl-NL" altLang="en-US" sz="2400" dirty="0" smtClean="0">
                 <a:latin typeface="+mj-lt"/>
                 <a:sym typeface="Wingdings" panose="05000000000000000000" pitchFamily="2" charset="2"/>
               </a:rPr>
-              <a:t> </a:t>
-            </a:r>
-            <a:r>
-              <a:rPr lang="nl-NL" altLang="en-US" sz="2400" dirty="0" smtClean="0">
-                <a:latin typeface="+mj-lt"/>
-                <a:sym typeface="Wingdings" panose="05000000000000000000" pitchFamily="2" charset="2"/>
-              </a:rPr>
-              <a:t>en </a:t>
-            </a:r>
-            <a:r>
-              <a:rPr lang="nl-NL" altLang="en-US" sz="2400" b="1" dirty="0">
-                <a:latin typeface="+mj-lt"/>
-                <a:sym typeface="Wingdings" panose="05000000000000000000" pitchFamily="2" charset="2"/>
-              </a:rPr>
-              <a:t>o</a:t>
-            </a:r>
-            <a:r>
-              <a:rPr lang="nl-NL" altLang="en-US" sz="2400" b="1" dirty="0" smtClean="0">
-                <a:latin typeface="+mj-lt"/>
-                <a:sym typeface="Wingdings" panose="05000000000000000000" pitchFamily="2" charset="2"/>
-              </a:rPr>
-              <a:t>vergankelijke werkwoorden</a:t>
-            </a:r>
-            <a:r>
-              <a:rPr lang="nl-NL" altLang="en-US" sz="2400" dirty="0" smtClean="0">
-                <a:latin typeface="+mj-lt"/>
-                <a:sym typeface="Wingdings" panose="05000000000000000000" pitchFamily="2" charset="2"/>
-              </a:rPr>
-              <a:t> introduceren een </a:t>
-            </a:r>
-            <a:r>
-              <a:rPr lang="nl-NL" altLang="en-US" sz="2400" dirty="0" smtClean="0">
-                <a:latin typeface="+mj-lt"/>
-                <a:sym typeface="Wingdings" panose="05000000000000000000" pitchFamily="2" charset="2"/>
-              </a:rPr>
-              <a:t>predicaat</a:t>
-            </a:r>
-            <a:r>
-              <a:rPr lang="nl-NL" altLang="en-US" sz="2400" dirty="0" smtClean="0">
-                <a:latin typeface="+mj-lt"/>
-                <a:sym typeface="Wingdings" panose="05000000000000000000" pitchFamily="2" charset="2"/>
-              </a:rPr>
-              <a:t>.</a:t>
+              <a:t>vergankelijke werkwoorden introduceren een predicaat.</a:t>
             </a:r>
           </a:p>
           <a:p>
@@ -10041,11 +10577,49 @@
             </a:pPr>
             <a:r>
               <a:rPr lang="nl-NL" altLang="en-US" sz="2400" dirty="0" smtClean="0">
+                <a:sym typeface="Wingdings" panose="05000000000000000000" pitchFamily="2" charset="2"/>
+              </a:rPr>
+              <a:t>Linken van predicaten a.d.h.v. hun signatuur</a:t>
+            </a:r>
+            <a:endParaRPr lang="nl-NL" altLang="en-US" sz="2400" dirty="0" smtClean="0">
+              <a:latin typeface="+mj-lt"/>
+              <a:sym typeface="Wingdings" panose="05000000000000000000" pitchFamily="2" charset="2"/>
+            </a:endParaRPr>
+          </a:p>
+          <a:p>
+            <a:pPr lvl="1" eaLnBrk="1" hangingPunct="1">
+              <a:spcBef>
+                <a:spcPct val="20000"/>
+              </a:spcBef>
+              <a:buFontTx/>
+              <a:buChar char="-"/>
+              <a:defRPr/>
+            </a:pPr>
+            <a:r>
+              <a:rPr lang="nl-NL" altLang="en-US" sz="2400" dirty="0" smtClean="0">
                 <a:latin typeface="+mj-lt"/>
                 <a:sym typeface="Wingdings" panose="05000000000000000000" pitchFamily="2" charset="2"/>
               </a:rPr>
-              <a:t>Twee predicaten met dezelfde signatuur zijn gelijk</a:t>
-            </a:r>
+              <a:t>Bv. Twee </a:t>
+            </a:r>
+            <a:r>
+              <a:rPr lang="nl-NL" altLang="en-US" sz="2400" dirty="0" smtClean="0">
+                <a:latin typeface="+mj-lt"/>
+                <a:sym typeface="Wingdings" panose="05000000000000000000" pitchFamily="2" charset="2"/>
+              </a:rPr>
+              <a:t>predicaten met dezelfde signatuur zijn </a:t>
+            </a:r>
+            <a:r>
+              <a:rPr lang="nl-NL" altLang="en-US" sz="2400" dirty="0" smtClean="0">
+                <a:latin typeface="+mj-lt"/>
+                <a:sym typeface="Wingdings" panose="05000000000000000000" pitchFamily="2" charset="2"/>
+              </a:rPr>
+              <a:t>gelijk</a:t>
+            </a:r>
+            <a:endParaRPr lang="nl-NL" altLang="en-US" sz="2400" dirty="0" smtClean="0">
+              <a:latin typeface="+mj-lt"/>
+              <a:sym typeface="Wingdings" panose="05000000000000000000" pitchFamily="2" charset="2"/>
+            </a:endParaRPr>
           </a:p>
           <a:p>
             <a:pPr eaLnBrk="1" hangingPunct="1">
@@ -10061,8 +10635,36 @@
                 <a:latin typeface="+mj-lt"/>
                 <a:sym typeface="Wingdings" panose="05000000000000000000" pitchFamily="2" charset="2"/>
               </a:rPr>
-              <a:t>Elk predicaat is een bijectie</a:t>
-            </a:r>
+              <a:t>Elk predicaat is een </a:t>
+            </a:r>
+            <a:r>
+              <a:rPr lang="nl-NL" altLang="en-US" sz="2400" dirty="0" smtClean="0">
+                <a:latin typeface="+mj-lt"/>
+                <a:sym typeface="Wingdings" panose="05000000000000000000" pitchFamily="2" charset="2"/>
+              </a:rPr>
+              <a:t>bijectie</a:t>
+            </a:r>
+          </a:p>
+          <a:p>
+            <a:pPr eaLnBrk="1" hangingPunct="1">
+              <a:spcBef>
+                <a:spcPct val="20000"/>
+              </a:spcBef>
+              <a:buFontTx/>
+              <a:buChar char="-"/>
+              <a:defRPr/>
+            </a:pPr>
+            <a:r>
+              <a:rPr lang="nl-NL" altLang="en-US" sz="2400" dirty="0" smtClean="0">
+                <a:latin typeface="+mj-lt"/>
+                <a:sym typeface="Wingdings" panose="05000000000000000000" pitchFamily="2" charset="2"/>
+              </a:rPr>
+              <a:t>Symmetrie-brekende axioma’s</a:t>
+            </a:r>
+            <a:endParaRPr lang="nl-NL" altLang="en-US" sz="2400" dirty="0" smtClean="0">
+              <a:latin typeface="+mj-lt"/>
+              <a:sym typeface="Wingdings" panose="05000000000000000000" pitchFamily="2" charset="2"/>
+            </a:endParaRPr>
           </a:p>
         </p:txBody>
       </p:sp>
@@ -10126,6 +10728,249 @@
           </a:prstGeom>
         </p:spPr>
       </p:pic>
+      <p:sp>
+        <p:nvSpPr>
+          <p:cNvPr id="35" name="Rectangle 37"/>
+          <p:cNvSpPr>
+            <a:spLocks noChangeArrowheads="1"/>
+          </p:cNvSpPr>
+          <p:nvPr/>
+        </p:nvSpPr>
+        <p:spPr bwMode="auto">
+          <a:xfrm>
+            <a:off x="277663" y="20957163"/>
+            <a:ext cx="2722861" cy="3728527"/>
+          </a:xfrm>
+          <a:prstGeom prst="rect">
+            <a:avLst/>
+          </a:prstGeom>
+          <a:solidFill>
+            <a:schemeClr val="bg1"/>
+          </a:solidFill>
+          <a:ln w="9525" algn="ctr">
+            <a:solidFill>
+              <a:srgbClr val="C5B9B5"/>
+            </a:solidFill>
+            <a:miter lim="800000"/>
+            <a:headEnd/>
+            <a:tailEnd/>
+          </a:ln>
+        </p:spPr>
+        <p:txBody>
+          <a:bodyPr lIns="182773" tIns="91388" rIns="182773" bIns="91388"/>
+          <a:lstStyle>
+            <a:lvl1pPr marL="342900" indent="-342900" eaLnBrk="0" hangingPunct="0">
+              <a:defRPr sz="5800">
+                <a:solidFill>
+                  <a:schemeClr val="tx1"/>
+                </a:solidFill>
+                <a:latin typeface="Arial" panose="020B0604020202020204" pitchFamily="34" charset="0"/>
+              </a:defRPr>
+            </a:lvl1pPr>
+            <a:lvl2pPr marL="742950" indent="-285750" eaLnBrk="0" hangingPunct="0">
+              <a:defRPr sz="5800">
+                <a:solidFill>
+                  <a:schemeClr val="tx1"/>
+                </a:solidFill>
+                <a:latin typeface="Arial" panose="020B0604020202020204" pitchFamily="34" charset="0"/>
+              </a:defRPr>
+            </a:lvl2pPr>
+            <a:lvl3pPr marL="1143000" indent="-228600" eaLnBrk="0" hangingPunct="0">
+              <a:defRPr sz="5800">
+                <a:solidFill>
+                  <a:schemeClr val="tx1"/>
+                </a:solidFill>
+                <a:latin typeface="Arial" panose="020B0604020202020204" pitchFamily="34" charset="0"/>
+              </a:defRPr>
+            </a:lvl3pPr>
+            <a:lvl4pPr marL="1600200" indent="-228600" eaLnBrk="0" hangingPunct="0">
+              <a:defRPr sz="5800">
+                <a:solidFill>
+                  <a:schemeClr val="tx1"/>
+                </a:solidFill>
+                <a:latin typeface="Arial" panose="020B0604020202020204" pitchFamily="34" charset="0"/>
+              </a:defRPr>
+            </a:lvl4pPr>
+            <a:lvl5pPr marL="2057400" indent="-228600" eaLnBrk="0" hangingPunct="0">
+              <a:defRPr sz="5800">
+                <a:solidFill>
+                  <a:schemeClr val="tx1"/>
+                </a:solidFill>
+                <a:latin typeface="Arial" panose="020B0604020202020204" pitchFamily="34" charset="0"/>
+              </a:defRPr>
+            </a:lvl5pPr>
+            <a:lvl6pPr marL="2514600" indent="-228600" eaLnBrk="0" fontAlgn="base" hangingPunct="0">
+              <a:spcBef>
+                <a:spcPct val="0"/>
+              </a:spcBef>
+              <a:spcAft>
+                <a:spcPct val="0"/>
+              </a:spcAft>
+              <a:defRPr sz="5800">
+                <a:solidFill>
+                  <a:schemeClr val="tx1"/>
+                </a:solidFill>
+                <a:latin typeface="Arial" panose="020B0604020202020204" pitchFamily="34" charset="0"/>
+              </a:defRPr>
+            </a:lvl6pPr>
+            <a:lvl7pPr marL="2971800" indent="-228600" eaLnBrk="0" fontAlgn="base" hangingPunct="0">
+              <a:spcBef>
+                <a:spcPct val="0"/>
+              </a:spcBef>
+              <a:spcAft>
+                <a:spcPct val="0"/>
+              </a:spcAft>
+              <a:defRPr sz="5800">
+                <a:solidFill>
+                  <a:schemeClr val="tx1"/>
+                </a:solidFill>
+                <a:latin typeface="Arial" panose="020B0604020202020204" pitchFamily="34" charset="0"/>
+              </a:defRPr>
+            </a:lvl7pPr>
+            <a:lvl8pPr marL="3429000" indent="-228600" eaLnBrk="0" fontAlgn="base" hangingPunct="0">
+              <a:spcBef>
+                <a:spcPct val="0"/>
+              </a:spcBef>
+              <a:spcAft>
+                <a:spcPct val="0"/>
+              </a:spcAft>
+              <a:defRPr sz="5800">
+                <a:solidFill>
+                  <a:schemeClr val="tx1"/>
+                </a:solidFill>
+                <a:latin typeface="Arial" panose="020B0604020202020204" pitchFamily="34" charset="0"/>
+              </a:defRPr>
+            </a:lvl8pPr>
+            <a:lvl9pPr marL="3886200" indent="-228600" eaLnBrk="0" fontAlgn="base" hangingPunct="0">
+              <a:spcBef>
+                <a:spcPct val="0"/>
+              </a:spcBef>
+              <a:spcAft>
+                <a:spcPct val="0"/>
+              </a:spcAft>
+              <a:defRPr sz="5800">
+                <a:solidFill>
+                  <a:schemeClr val="tx1"/>
+                </a:solidFill>
+                <a:latin typeface="Arial" panose="020B0604020202020204" pitchFamily="34" charset="0"/>
+              </a:defRPr>
+            </a:lvl9pPr>
+          </a:lstStyle>
+          <a:p>
+            <a:pPr marL="0" indent="0" eaLnBrk="1" hangingPunct="1">
+              <a:defRPr/>
+            </a:pPr>
+            <a:r>
+              <a:rPr lang="en-US" altLang="en-US" sz="1800" dirty="0">
+                <a:latin typeface="Calibri" panose="020F0502020204030204" pitchFamily="34" charset="0"/>
+                <a:ea typeface="Tahoma" panose="020B0604030504040204" pitchFamily="34" charset="0"/>
+                <a:cs typeface="Calibri" panose="020F0502020204030204" pitchFamily="34" charset="0"/>
+              </a:rPr>
+              <a:t>P. Blackburn and J. </a:t>
+            </a:r>
+            <a:r>
+              <a:rPr lang="en-US" altLang="en-US" sz="1800" dirty="0" err="1">
+                <a:latin typeface="Calibri" panose="020F0502020204030204" pitchFamily="34" charset="0"/>
+                <a:ea typeface="Tahoma" panose="020B0604030504040204" pitchFamily="34" charset="0"/>
+                <a:cs typeface="Calibri" panose="020F0502020204030204" pitchFamily="34" charset="0"/>
+              </a:rPr>
+              <a:t>Bos</a:t>
+            </a:r>
+            <a:r>
+              <a:rPr lang="en-US" altLang="en-US" sz="1800" dirty="0">
+                <a:latin typeface="Calibri" panose="020F0502020204030204" pitchFamily="34" charset="0"/>
+                <a:ea typeface="Tahoma" panose="020B0604030504040204" pitchFamily="34" charset="0"/>
+                <a:cs typeface="Calibri" panose="020F0502020204030204" pitchFamily="34" charset="0"/>
+              </a:rPr>
+              <a:t>. Representation and inference for natural language. </a:t>
+            </a:r>
+            <a:r>
+              <a:rPr lang="en-US" altLang="en-US" sz="1800" dirty="0" smtClean="0">
+                <a:latin typeface="Calibri" panose="020F0502020204030204" pitchFamily="34" charset="0"/>
+                <a:ea typeface="Tahoma" panose="020B0604030504040204" pitchFamily="34" charset="0"/>
+                <a:cs typeface="Calibri" panose="020F0502020204030204" pitchFamily="34" charset="0"/>
+              </a:rPr>
+              <a:t>A first </a:t>
+            </a:r>
+            <a:r>
+              <a:rPr lang="en-US" altLang="en-US" sz="1800" dirty="0">
+                <a:latin typeface="Calibri" panose="020F0502020204030204" pitchFamily="34" charset="0"/>
+                <a:ea typeface="Tahoma" panose="020B0604030504040204" pitchFamily="34" charset="0"/>
+                <a:cs typeface="Calibri" panose="020F0502020204030204" pitchFamily="34" charset="0"/>
+              </a:rPr>
+              <a:t>course in computational semantics. CSLI, 2005.</a:t>
+            </a:r>
+          </a:p>
+          <a:p>
+            <a:pPr marL="0" indent="0" eaLnBrk="1" hangingPunct="1">
+              <a:defRPr/>
+            </a:pPr>
+            <a:endParaRPr lang="en-US" altLang="en-US" sz="1800" dirty="0" smtClean="0">
+              <a:latin typeface="Calibri" panose="020F0502020204030204" pitchFamily="34" charset="0"/>
+              <a:ea typeface="Tahoma" panose="020B0604030504040204" pitchFamily="34" charset="0"/>
+              <a:cs typeface="Calibri" panose="020F0502020204030204" pitchFamily="34" charset="0"/>
+            </a:endParaRPr>
+          </a:p>
+          <a:p>
+            <a:pPr marL="0" indent="0" eaLnBrk="1" hangingPunct="1">
+              <a:defRPr/>
+            </a:pPr>
+            <a:r>
+              <a:rPr lang="en-US" altLang="en-US" sz="1800" dirty="0" smtClean="0">
+                <a:latin typeface="Calibri" panose="020F0502020204030204" pitchFamily="34" charset="0"/>
+                <a:ea typeface="Tahoma" panose="020B0604030504040204" pitchFamily="34" charset="0"/>
+                <a:cs typeface="Calibri" panose="020F0502020204030204" pitchFamily="34" charset="0"/>
+              </a:rPr>
+              <a:t>P</a:t>
+            </a:r>
+            <a:r>
+              <a:rPr lang="en-US" altLang="en-US" sz="1800" dirty="0">
+                <a:latin typeface="Calibri" panose="020F0502020204030204" pitchFamily="34" charset="0"/>
+                <a:ea typeface="Tahoma" panose="020B0604030504040204" pitchFamily="34" charset="0"/>
+                <a:cs typeface="Calibri" panose="020F0502020204030204" pitchFamily="34" charset="0"/>
+              </a:rPr>
+              <a:t>. Blackburn and J. </a:t>
+            </a:r>
+            <a:r>
+              <a:rPr lang="en-US" altLang="en-US" sz="1800" dirty="0" err="1">
+                <a:latin typeface="Calibri" panose="020F0502020204030204" pitchFamily="34" charset="0"/>
+                <a:ea typeface="Tahoma" panose="020B0604030504040204" pitchFamily="34" charset="0"/>
+                <a:cs typeface="Calibri" panose="020F0502020204030204" pitchFamily="34" charset="0"/>
+              </a:rPr>
+              <a:t>Bos</a:t>
+            </a:r>
+            <a:r>
+              <a:rPr lang="en-US" altLang="en-US" sz="1800" dirty="0">
+                <a:latin typeface="Calibri" panose="020F0502020204030204" pitchFamily="34" charset="0"/>
+                <a:ea typeface="Tahoma" panose="020B0604030504040204" pitchFamily="34" charset="0"/>
+                <a:cs typeface="Calibri" panose="020F0502020204030204" pitchFamily="34" charset="0"/>
+              </a:rPr>
+              <a:t>. Working with discourse representation theory. </a:t>
+            </a:r>
+            <a:r>
+              <a:rPr lang="en-US" altLang="en-US" sz="1800" dirty="0" smtClean="0">
+                <a:latin typeface="Calibri" panose="020F0502020204030204" pitchFamily="34" charset="0"/>
+                <a:ea typeface="Tahoma" panose="020B0604030504040204" pitchFamily="34" charset="0"/>
+                <a:cs typeface="Calibri" panose="020F0502020204030204" pitchFamily="34" charset="0"/>
+              </a:rPr>
+              <a:t>An Advanced </a:t>
+            </a:r>
+            <a:r>
+              <a:rPr lang="en-US" altLang="en-US" sz="1800" dirty="0">
+                <a:latin typeface="Calibri" panose="020F0502020204030204" pitchFamily="34" charset="0"/>
+                <a:ea typeface="Tahoma" panose="020B0604030504040204" pitchFamily="34" charset="0"/>
+                <a:cs typeface="Calibri" panose="020F0502020204030204" pitchFamily="34" charset="0"/>
+              </a:rPr>
+              <a:t>Course in Computational Semantics, 2006.</a:t>
+            </a:r>
+            <a:endParaRPr lang="en-US" altLang="en-US" sz="1800" dirty="0" smtClean="0">
+              <a:latin typeface="Calibri" panose="020F0502020204030204" pitchFamily="34" charset="0"/>
+              <a:ea typeface="Tahoma" panose="020B0604030504040204" pitchFamily="34" charset="0"/>
+              <a:cs typeface="Calibri" panose="020F0502020204030204" pitchFamily="34" charset="0"/>
+            </a:endParaRPr>
+          </a:p>
+        </p:txBody>
+      </p:sp>
     </p:spTree>
   </p:cSld>
   <p:clrMapOvr>

</xml_diff>